<commit_message>
Cleaned files and added transit
GTFS files were cleaned
</commit_message>
<xml_diff>
--- a/Presentation_JS.pptx
+++ b/Presentation_JS.pptx
@@ -7,6 +7,14 @@
   <p:sldIdLst>
     <p:sldId id="256" r:id="rId2"/>
     <p:sldId id="257" r:id="rId3"/>
+    <p:sldId id="258" r:id="rId4"/>
+    <p:sldId id="259" r:id="rId5"/>
+    <p:sldId id="260" r:id="rId6"/>
+    <p:sldId id="261" r:id="rId7"/>
+    <p:sldId id="265" r:id="rId8"/>
+    <p:sldId id="262" r:id="rId9"/>
+    <p:sldId id="264" r:id="rId10"/>
+    <p:sldId id="263" r:id="rId11"/>
   </p:sldIdLst>
   <p:sldSz cx="12192000" cy="6858000"/>
   <p:notesSz cx="6858000" cy="9144000"/>
@@ -105,13 +113,52 @@
       </a:defRPr>
     </a:lvl9pPr>
   </p:defaultTextStyle>
+  <p:extLst>
+    <p:ext uri="{521415D9-36F7-43E2-AB2F-B90AF26B5E84}">
+      <p14:sectionLst xmlns:p14="http://schemas.microsoft.com/office/powerpoint/2010/main">
+        <p14:section name="Default Section" id="{E5522A53-E6A9-48E4-973A-7EAC8B5A2800}">
+          <p14:sldIdLst>
+            <p14:sldId id="256"/>
+            <p14:sldId id="257"/>
+          </p14:sldIdLst>
+        </p14:section>
+        <p14:section name="Lit Review" id="{B16488F8-6BA4-48D6-BCEF-4DF523C4EF10}">
+          <p14:sldIdLst>
+            <p14:sldId id="258"/>
+            <p14:sldId id="259"/>
+          </p14:sldIdLst>
+        </p14:section>
+        <p14:section name="Framework" id="{FB9607A2-F1F8-4692-9E74-2BAA050F4E9C}">
+          <p14:sldIdLst>
+            <p14:sldId id="260"/>
+          </p14:sldIdLst>
+        </p14:section>
+        <p14:section name="Methodology" id="{37AF454C-AE21-4555-AFEB-F0B8FD88ACAF}">
+          <p14:sldIdLst>
+            <p14:sldId id="261"/>
+            <p14:sldId id="265"/>
+            <p14:sldId id="262"/>
+            <p14:sldId id="264"/>
+          </p14:sldIdLst>
+        </p14:section>
+        <p14:section name="Analysis" id="{7083D278-AF4E-402D-9435-6C6857E70C36}">
+          <p14:sldIdLst>
+            <p14:sldId id="263"/>
+          </p14:sldIdLst>
+        </p14:section>
+      </p14:sectionLst>
+    </p:ext>
+    <p:ext uri="{EFAFB233-063F-42B5-8137-9DF3F51BA10A}">
+      <p15:sldGuideLst xmlns:p15="http://schemas.microsoft.com/office/powerpoint/2012/main"/>
+    </p:ext>
+  </p:extLst>
 </p:presentation>
 </file>
 
 <file path=ppt/revisionInfo.xml><?xml version="1.0" encoding="utf-8"?>
 <p1510:revInfo xmlns:a="http://schemas.openxmlformats.org/drawingml/2006/main" xmlns:r="http://schemas.openxmlformats.org/officeDocument/2006/relationships" xmlns:p1510="http://schemas.microsoft.com/office/powerpoint/2015/10/main">
   <p1510:revLst>
-    <p1510:client id="{2ED13A4E-D99A-4C5D-B659-30565ACA1CE6}" v="2" dt="2022-02-08T14:28:30.307"/>
+    <p1510:client id="{4A9E0824-8EE2-4813-AF4A-9ADB3938F59E}" v="10" dt="2022-03-23T05:08:05.589"/>
   </p1510:revLst>
 </p1510:revInfo>
 </file>
@@ -504,6 +551,382 @@
           </pc:sldLayoutMkLst>
         </pc:sldLayoutChg>
       </pc:sldMasterChg>
+    </pc:docChg>
+  </pc:docChgLst>
+  <pc:docChgLst>
+    <pc:chgData name="Jonathon Sun" userId="ac7bb53f-3ddc-43c3-a124-018177ab0681" providerId="ADAL" clId="{4A9E0824-8EE2-4813-AF4A-9ADB3938F59E}"/>
+    <pc:docChg chg="undo custSel addSld modSld addSection modSection">
+      <pc:chgData name="Jonathon Sun" userId="ac7bb53f-3ddc-43c3-a124-018177ab0681" providerId="ADAL" clId="{4A9E0824-8EE2-4813-AF4A-9ADB3938F59E}" dt="2022-03-23T05:08:26.090" v="515" actId="14100"/>
+      <pc:docMkLst>
+        <pc:docMk/>
+      </pc:docMkLst>
+      <pc:sldChg chg="modSp mod">
+        <pc:chgData name="Jonathon Sun" userId="ac7bb53f-3ddc-43c3-a124-018177ab0681" providerId="ADAL" clId="{4A9E0824-8EE2-4813-AF4A-9ADB3938F59E}" dt="2022-03-23T04:56:05.357" v="384" actId="20577"/>
+        <pc:sldMkLst>
+          <pc:docMk/>
+          <pc:sldMk cId="605034550" sldId="257"/>
+        </pc:sldMkLst>
+        <pc:spChg chg="mod">
+          <ac:chgData name="Jonathon Sun" userId="ac7bb53f-3ddc-43c3-a124-018177ab0681" providerId="ADAL" clId="{4A9E0824-8EE2-4813-AF4A-9ADB3938F59E}" dt="2022-03-23T04:50:34.821" v="7" actId="20577"/>
+          <ac:spMkLst>
+            <pc:docMk/>
+            <pc:sldMk cId="605034550" sldId="257"/>
+            <ac:spMk id="2" creationId="{152BDFF2-D920-409D-B7E7-6B8D09EBB6EB}"/>
+          </ac:spMkLst>
+        </pc:spChg>
+        <pc:spChg chg="mod">
+          <ac:chgData name="Jonathon Sun" userId="ac7bb53f-3ddc-43c3-a124-018177ab0681" providerId="ADAL" clId="{4A9E0824-8EE2-4813-AF4A-9ADB3938F59E}" dt="2022-03-23T04:56:05.357" v="384" actId="20577"/>
+          <ac:spMkLst>
+            <pc:docMk/>
+            <pc:sldMk cId="605034550" sldId="257"/>
+            <ac:spMk id="3" creationId="{E66BCE39-0B9E-4237-A8A5-55A21FCC22B3}"/>
+          </ac:spMkLst>
+        </pc:spChg>
+      </pc:sldChg>
+      <pc:sldChg chg="modSp new mod">
+        <pc:chgData name="Jonathon Sun" userId="ac7bb53f-3ddc-43c3-a124-018177ab0681" providerId="ADAL" clId="{4A9E0824-8EE2-4813-AF4A-9ADB3938F59E}" dt="2022-03-23T04:53:21.710" v="178" actId="6549"/>
+        <pc:sldMkLst>
+          <pc:docMk/>
+          <pc:sldMk cId="1230411320" sldId="258"/>
+        </pc:sldMkLst>
+        <pc:spChg chg="mod">
+          <ac:chgData name="Jonathon Sun" userId="ac7bb53f-3ddc-43c3-a124-018177ab0681" providerId="ADAL" clId="{4A9E0824-8EE2-4813-AF4A-9ADB3938F59E}" dt="2022-03-23T04:52:18.909" v="131" actId="20577"/>
+          <ac:spMkLst>
+            <pc:docMk/>
+            <pc:sldMk cId="1230411320" sldId="258"/>
+            <ac:spMk id="2" creationId="{833A95E3-FC85-4224-B40C-3A06DA2FF671}"/>
+          </ac:spMkLst>
+        </pc:spChg>
+        <pc:spChg chg="mod">
+          <ac:chgData name="Jonathon Sun" userId="ac7bb53f-3ddc-43c3-a124-018177ab0681" providerId="ADAL" clId="{4A9E0824-8EE2-4813-AF4A-9ADB3938F59E}" dt="2022-03-23T04:53:21.710" v="178" actId="6549"/>
+          <ac:spMkLst>
+            <pc:docMk/>
+            <pc:sldMk cId="1230411320" sldId="258"/>
+            <ac:spMk id="3" creationId="{E29DA367-DF65-4F14-A717-65E356E8E284}"/>
+          </ac:spMkLst>
+        </pc:spChg>
+      </pc:sldChg>
+      <pc:sldChg chg="new">
+        <pc:chgData name="Jonathon Sun" userId="ac7bb53f-3ddc-43c3-a124-018177ab0681" providerId="ADAL" clId="{4A9E0824-8EE2-4813-AF4A-9ADB3938F59E}" dt="2022-03-23T04:53:31.425" v="179" actId="680"/>
+        <pc:sldMkLst>
+          <pc:docMk/>
+          <pc:sldMk cId="3062073168" sldId="259"/>
+        </pc:sldMkLst>
+      </pc:sldChg>
+      <pc:sldChg chg="modSp new mod">
+        <pc:chgData name="Jonathon Sun" userId="ac7bb53f-3ddc-43c3-a124-018177ab0681" providerId="ADAL" clId="{4A9E0824-8EE2-4813-AF4A-9ADB3938F59E}" dt="2022-03-23T04:54:17.693" v="253" actId="20577"/>
+        <pc:sldMkLst>
+          <pc:docMk/>
+          <pc:sldMk cId="3886972306" sldId="260"/>
+        </pc:sldMkLst>
+        <pc:spChg chg="mod">
+          <ac:chgData name="Jonathon Sun" userId="ac7bb53f-3ddc-43c3-a124-018177ab0681" providerId="ADAL" clId="{4A9E0824-8EE2-4813-AF4A-9ADB3938F59E}" dt="2022-03-23T04:54:02.725" v="240" actId="20577"/>
+          <ac:spMkLst>
+            <pc:docMk/>
+            <pc:sldMk cId="3886972306" sldId="260"/>
+            <ac:spMk id="2" creationId="{143BE065-7EA7-43E3-BBF4-94DEAE14615A}"/>
+          </ac:spMkLst>
+        </pc:spChg>
+        <pc:spChg chg="mod">
+          <ac:chgData name="Jonathon Sun" userId="ac7bb53f-3ddc-43c3-a124-018177ab0681" providerId="ADAL" clId="{4A9E0824-8EE2-4813-AF4A-9ADB3938F59E}" dt="2022-03-23T04:54:17.693" v="253" actId="20577"/>
+          <ac:spMkLst>
+            <pc:docMk/>
+            <pc:sldMk cId="3886972306" sldId="260"/>
+            <ac:spMk id="3" creationId="{A8210CA2-232C-4240-9A57-F1DA2626061B}"/>
+          </ac:spMkLst>
+        </pc:spChg>
+      </pc:sldChg>
+      <pc:sldChg chg="modSp new mod">
+        <pc:chgData name="Jonathon Sun" userId="ac7bb53f-3ddc-43c3-a124-018177ab0681" providerId="ADAL" clId="{4A9E0824-8EE2-4813-AF4A-9ADB3938F59E}" dt="2022-03-23T04:55:53.557" v="361" actId="20577"/>
+        <pc:sldMkLst>
+          <pc:docMk/>
+          <pc:sldMk cId="2876830951" sldId="261"/>
+        </pc:sldMkLst>
+        <pc:spChg chg="mod">
+          <ac:chgData name="Jonathon Sun" userId="ac7bb53f-3ddc-43c3-a124-018177ab0681" providerId="ADAL" clId="{4A9E0824-8EE2-4813-AF4A-9ADB3938F59E}" dt="2022-03-23T04:55:40.677" v="302" actId="20577"/>
+          <ac:spMkLst>
+            <pc:docMk/>
+            <pc:sldMk cId="2876830951" sldId="261"/>
+            <ac:spMk id="2" creationId="{2995FD44-2C81-4706-BB60-DADE730E76FD}"/>
+          </ac:spMkLst>
+        </pc:spChg>
+        <pc:spChg chg="mod">
+          <ac:chgData name="Jonathon Sun" userId="ac7bb53f-3ddc-43c3-a124-018177ab0681" providerId="ADAL" clId="{4A9E0824-8EE2-4813-AF4A-9ADB3938F59E}" dt="2022-03-23T04:55:53.557" v="361" actId="20577"/>
+          <ac:spMkLst>
+            <pc:docMk/>
+            <pc:sldMk cId="2876830951" sldId="261"/>
+            <ac:spMk id="3" creationId="{EF982DE6-B922-4713-B2EB-88A480F6A7A2}"/>
+          </ac:spMkLst>
+        </pc:spChg>
+      </pc:sldChg>
+      <pc:sldChg chg="addSp modSp new mod setBg">
+        <pc:chgData name="Jonathon Sun" userId="ac7bb53f-3ddc-43c3-a124-018177ab0681" providerId="ADAL" clId="{4A9E0824-8EE2-4813-AF4A-9ADB3938F59E}" dt="2022-03-23T05:05:43.262" v="468" actId="20577"/>
+        <pc:sldMkLst>
+          <pc:docMk/>
+          <pc:sldMk cId="3869791731" sldId="262"/>
+        </pc:sldMkLst>
+        <pc:spChg chg="mod">
+          <ac:chgData name="Jonathon Sun" userId="ac7bb53f-3ddc-43c3-a124-018177ab0681" providerId="ADAL" clId="{4A9E0824-8EE2-4813-AF4A-9ADB3938F59E}" dt="2022-03-23T05:03:40.789" v="398" actId="26606"/>
+          <ac:spMkLst>
+            <pc:docMk/>
+            <pc:sldMk cId="3869791731" sldId="262"/>
+            <ac:spMk id="2" creationId="{24EA14AD-C7D9-4A97-BA8F-A8F147F58940}"/>
+          </ac:spMkLst>
+        </pc:spChg>
+        <pc:spChg chg="mod">
+          <ac:chgData name="Jonathon Sun" userId="ac7bb53f-3ddc-43c3-a124-018177ab0681" providerId="ADAL" clId="{4A9E0824-8EE2-4813-AF4A-9ADB3938F59E}" dt="2022-03-23T05:05:43.262" v="468" actId="20577"/>
+          <ac:spMkLst>
+            <pc:docMk/>
+            <pc:sldMk cId="3869791731" sldId="262"/>
+            <ac:spMk id="3" creationId="{BE95302E-27F8-4506-AA30-DBC75E3AD29A}"/>
+          </ac:spMkLst>
+        </pc:spChg>
+        <pc:spChg chg="add">
+          <ac:chgData name="Jonathon Sun" userId="ac7bb53f-3ddc-43c3-a124-018177ab0681" providerId="ADAL" clId="{4A9E0824-8EE2-4813-AF4A-9ADB3938F59E}" dt="2022-03-23T05:03:40.789" v="398" actId="26606"/>
+          <ac:spMkLst>
+            <pc:docMk/>
+            <pc:sldMk cId="3869791731" sldId="262"/>
+            <ac:spMk id="12" creationId="{50666DC1-CD27-4874-9484-9D06C59FE4D0}"/>
+          </ac:spMkLst>
+        </pc:spChg>
+        <pc:spChg chg="add">
+          <ac:chgData name="Jonathon Sun" userId="ac7bb53f-3ddc-43c3-a124-018177ab0681" providerId="ADAL" clId="{4A9E0824-8EE2-4813-AF4A-9ADB3938F59E}" dt="2022-03-23T05:03:40.789" v="398" actId="26606"/>
+          <ac:spMkLst>
+            <pc:docMk/>
+            <pc:sldMk cId="3869791731" sldId="262"/>
+            <ac:spMk id="14" creationId="{8A2FCF07-6918-45A6-B28F-1025FEBA7AEF}"/>
+          </ac:spMkLst>
+        </pc:spChg>
+        <pc:spChg chg="add">
+          <ac:chgData name="Jonathon Sun" userId="ac7bb53f-3ddc-43c3-a124-018177ab0681" providerId="ADAL" clId="{4A9E0824-8EE2-4813-AF4A-9ADB3938F59E}" dt="2022-03-23T05:03:40.789" v="398" actId="26606"/>
+          <ac:spMkLst>
+            <pc:docMk/>
+            <pc:sldMk cId="3869791731" sldId="262"/>
+            <ac:spMk id="16" creationId="{72EF3F9A-9717-4ACB-A30D-96694842C4F7}"/>
+          </ac:spMkLst>
+        </pc:spChg>
+        <pc:grpChg chg="add">
+          <ac:chgData name="Jonathon Sun" userId="ac7bb53f-3ddc-43c3-a124-018177ab0681" providerId="ADAL" clId="{4A9E0824-8EE2-4813-AF4A-9ADB3938F59E}" dt="2022-03-23T05:03:40.789" v="398" actId="26606"/>
+          <ac:grpSpMkLst>
+            <pc:docMk/>
+            <pc:sldMk cId="3869791731" sldId="262"/>
+            <ac:grpSpMk id="18" creationId="{AFB7DB5B-426F-4EA9-BE51-7E14D257DE22}"/>
+          </ac:grpSpMkLst>
+        </pc:grpChg>
+        <pc:picChg chg="add mod ord">
+          <ac:chgData name="Jonathon Sun" userId="ac7bb53f-3ddc-43c3-a124-018177ab0681" providerId="ADAL" clId="{4A9E0824-8EE2-4813-AF4A-9ADB3938F59E}" dt="2022-03-23T05:05:32.301" v="438" actId="1076"/>
+          <ac:picMkLst>
+            <pc:docMk/>
+            <pc:sldMk cId="3869791731" sldId="262"/>
+            <ac:picMk id="5" creationId="{05C3A40E-D50A-4A77-9C44-E33C76659B6A}"/>
+          </ac:picMkLst>
+        </pc:picChg>
+        <pc:picChg chg="add mod">
+          <ac:chgData name="Jonathon Sun" userId="ac7bb53f-3ddc-43c3-a124-018177ab0681" providerId="ADAL" clId="{4A9E0824-8EE2-4813-AF4A-9ADB3938F59E}" dt="2022-03-23T05:05:28.380" v="436" actId="1076"/>
+          <ac:picMkLst>
+            <pc:docMk/>
+            <pc:sldMk cId="3869791731" sldId="262"/>
+            <ac:picMk id="7" creationId="{0F3684CD-1108-41B5-B46F-C8B1868980E5}"/>
+          </ac:picMkLst>
+        </pc:picChg>
+      </pc:sldChg>
+      <pc:sldChg chg="addSp delSp modSp new mod">
+        <pc:chgData name="Jonathon Sun" userId="ac7bb53f-3ddc-43c3-a124-018177ab0681" providerId="ADAL" clId="{4A9E0824-8EE2-4813-AF4A-9ADB3938F59E}" dt="2022-03-23T05:08:26.090" v="515" actId="14100"/>
+        <pc:sldMkLst>
+          <pc:docMk/>
+          <pc:sldMk cId="1888975568" sldId="263"/>
+        </pc:sldMkLst>
+        <pc:spChg chg="del">
+          <ac:chgData name="Jonathon Sun" userId="ac7bb53f-3ddc-43c3-a124-018177ab0681" providerId="ADAL" clId="{4A9E0824-8EE2-4813-AF4A-9ADB3938F59E}" dt="2022-03-23T05:07:26.850" v="494"/>
+          <ac:spMkLst>
+            <pc:docMk/>
+            <pc:sldMk cId="1888975568" sldId="263"/>
+            <ac:spMk id="3" creationId="{78C074F5-07AD-47A0-A6A4-C142D239DC3C}"/>
+          </ac:spMkLst>
+        </pc:spChg>
+        <pc:spChg chg="add del mod">
+          <ac:chgData name="Jonathon Sun" userId="ac7bb53f-3ddc-43c3-a124-018177ab0681" providerId="ADAL" clId="{4A9E0824-8EE2-4813-AF4A-9ADB3938F59E}" dt="2022-03-23T05:08:01.895" v="498"/>
+          <ac:spMkLst>
+            <pc:docMk/>
+            <pc:sldMk cId="1888975568" sldId="263"/>
+            <ac:spMk id="7" creationId="{4D99E59F-6D91-4724-BE27-1D9E3AB76E02}"/>
+          </ac:spMkLst>
+        </pc:spChg>
+        <pc:picChg chg="add del mod">
+          <ac:chgData name="Jonathon Sun" userId="ac7bb53f-3ddc-43c3-a124-018177ab0681" providerId="ADAL" clId="{4A9E0824-8EE2-4813-AF4A-9ADB3938F59E}" dt="2022-03-23T05:07:30.367" v="497" actId="478"/>
+          <ac:picMkLst>
+            <pc:docMk/>
+            <pc:sldMk cId="1888975568" sldId="263"/>
+            <ac:picMk id="5" creationId="{25C663B3-0460-4AF7-82F5-B9715BF17DC3}"/>
+          </ac:picMkLst>
+        </pc:picChg>
+        <pc:picChg chg="add mod">
+          <ac:chgData name="Jonathon Sun" userId="ac7bb53f-3ddc-43c3-a124-018177ab0681" providerId="ADAL" clId="{4A9E0824-8EE2-4813-AF4A-9ADB3938F59E}" dt="2022-03-23T05:08:26.090" v="515" actId="14100"/>
+          <ac:picMkLst>
+            <pc:docMk/>
+            <pc:sldMk cId="1888975568" sldId="263"/>
+            <ac:picMk id="9" creationId="{CBAB2BE4-7B61-4D06-947B-CDA617D32957}"/>
+          </ac:picMkLst>
+        </pc:picChg>
+        <pc:picChg chg="add mod">
+          <ac:chgData name="Jonathon Sun" userId="ac7bb53f-3ddc-43c3-a124-018177ab0681" providerId="ADAL" clId="{4A9E0824-8EE2-4813-AF4A-9ADB3938F59E}" dt="2022-03-23T05:08:18.742" v="513" actId="14100"/>
+          <ac:picMkLst>
+            <pc:docMk/>
+            <pc:sldMk cId="1888975568" sldId="263"/>
+            <ac:picMk id="11" creationId="{FFCC5D69-F873-4230-BD84-699A7E9D79EE}"/>
+          </ac:picMkLst>
+        </pc:picChg>
+      </pc:sldChg>
+      <pc:sldChg chg="addSp delSp modSp new mod setBg">
+        <pc:chgData name="Jonathon Sun" userId="ac7bb53f-3ddc-43c3-a124-018177ab0681" providerId="ADAL" clId="{4A9E0824-8EE2-4813-AF4A-9ADB3938F59E}" dt="2022-03-23T05:05:52.578" v="471"/>
+        <pc:sldMkLst>
+          <pc:docMk/>
+          <pc:sldMk cId="1286035323" sldId="264"/>
+        </pc:sldMkLst>
+        <pc:spChg chg="mod">
+          <ac:chgData name="Jonathon Sun" userId="ac7bb53f-3ddc-43c3-a124-018177ab0681" providerId="ADAL" clId="{4A9E0824-8EE2-4813-AF4A-9ADB3938F59E}" dt="2022-03-23T05:04:50.853" v="421" actId="26606"/>
+          <ac:spMkLst>
+            <pc:docMk/>
+            <pc:sldMk cId="1286035323" sldId="264"/>
+            <ac:spMk id="2" creationId="{85B4ECD2-F691-4FF0-A59B-C5BE35CDD714}"/>
+          </ac:spMkLst>
+        </pc:spChg>
+        <pc:spChg chg="del">
+          <ac:chgData name="Jonathon Sun" userId="ac7bb53f-3ddc-43c3-a124-018177ab0681" providerId="ADAL" clId="{4A9E0824-8EE2-4813-AF4A-9ADB3938F59E}" dt="2022-03-23T05:04:24.017" v="402"/>
+          <ac:spMkLst>
+            <pc:docMk/>
+            <pc:sldMk cId="1286035323" sldId="264"/>
+            <ac:spMk id="3" creationId="{07A03A1D-ABA1-492A-8980-B16C775F9694}"/>
+          </ac:spMkLst>
+        </pc:spChg>
+        <pc:spChg chg="add">
+          <ac:chgData name="Jonathon Sun" userId="ac7bb53f-3ddc-43c3-a124-018177ab0681" providerId="ADAL" clId="{4A9E0824-8EE2-4813-AF4A-9ADB3938F59E}" dt="2022-03-23T05:04:50.853" v="421" actId="26606"/>
+          <ac:spMkLst>
+            <pc:docMk/>
+            <pc:sldMk cId="1286035323" sldId="264"/>
+            <ac:spMk id="12" creationId="{50666DC1-CD27-4874-9484-9D06C59FE4D0}"/>
+          </ac:spMkLst>
+        </pc:spChg>
+        <pc:spChg chg="add">
+          <ac:chgData name="Jonathon Sun" userId="ac7bb53f-3ddc-43c3-a124-018177ab0681" providerId="ADAL" clId="{4A9E0824-8EE2-4813-AF4A-9ADB3938F59E}" dt="2022-03-23T05:04:50.853" v="421" actId="26606"/>
+          <ac:spMkLst>
+            <pc:docMk/>
+            <pc:sldMk cId="1286035323" sldId="264"/>
+            <ac:spMk id="14" creationId="{8A2FCF07-6918-45A6-B28F-1025FEBA7AEF}"/>
+          </ac:spMkLst>
+        </pc:spChg>
+        <pc:spChg chg="add del">
+          <ac:chgData name="Jonathon Sun" userId="ac7bb53f-3ddc-43c3-a124-018177ab0681" providerId="ADAL" clId="{4A9E0824-8EE2-4813-AF4A-9ADB3938F59E}" dt="2022-03-23T05:05:49.193" v="470" actId="22"/>
+          <ac:spMkLst>
+            <pc:docMk/>
+            <pc:sldMk cId="1286035323" sldId="264"/>
+            <ac:spMk id="15" creationId="{C6B80555-8CA4-4B29-9CF7-03A0007179AE}"/>
+          </ac:spMkLst>
+        </pc:spChg>
+        <pc:spChg chg="add">
+          <ac:chgData name="Jonathon Sun" userId="ac7bb53f-3ddc-43c3-a124-018177ab0681" providerId="ADAL" clId="{4A9E0824-8EE2-4813-AF4A-9ADB3938F59E}" dt="2022-03-23T05:04:50.853" v="421" actId="26606"/>
+          <ac:spMkLst>
+            <pc:docMk/>
+            <pc:sldMk cId="1286035323" sldId="264"/>
+            <ac:spMk id="16" creationId="{72EF3F9A-9717-4ACB-A30D-96694842C4F7}"/>
+          </ac:spMkLst>
+        </pc:spChg>
+        <pc:spChg chg="add mod">
+          <ac:chgData name="Jonathon Sun" userId="ac7bb53f-3ddc-43c3-a124-018177ab0681" providerId="ADAL" clId="{4A9E0824-8EE2-4813-AF4A-9ADB3938F59E}" dt="2022-03-23T05:05:52.578" v="471"/>
+          <ac:spMkLst>
+            <pc:docMk/>
+            <pc:sldMk cId="1286035323" sldId="264"/>
+            <ac:spMk id="17" creationId="{978E7345-A37E-479D-99B1-B18756283B43}"/>
+          </ac:spMkLst>
+        </pc:spChg>
+        <pc:grpChg chg="add">
+          <ac:chgData name="Jonathon Sun" userId="ac7bb53f-3ddc-43c3-a124-018177ab0681" providerId="ADAL" clId="{4A9E0824-8EE2-4813-AF4A-9ADB3938F59E}" dt="2022-03-23T05:04:50.853" v="421" actId="26606"/>
+          <ac:grpSpMkLst>
+            <pc:docMk/>
+            <pc:sldMk cId="1286035323" sldId="264"/>
+            <ac:grpSpMk id="18" creationId="{AFB7DB5B-426F-4EA9-BE51-7E14D257DE22}"/>
+          </ac:grpSpMkLst>
+        </pc:grpChg>
+        <pc:picChg chg="add mod ord">
+          <ac:chgData name="Jonathon Sun" userId="ac7bb53f-3ddc-43c3-a124-018177ab0681" providerId="ADAL" clId="{4A9E0824-8EE2-4813-AF4A-9ADB3938F59E}" dt="2022-03-23T05:05:10.138" v="431" actId="1076"/>
+          <ac:picMkLst>
+            <pc:docMk/>
+            <pc:sldMk cId="1286035323" sldId="264"/>
+            <ac:picMk id="5" creationId="{FCBF1390-4D9A-4A7C-9F39-F152A30EA1D8}"/>
+          </ac:picMkLst>
+        </pc:picChg>
+        <pc:picChg chg="add mod">
+          <ac:chgData name="Jonathon Sun" userId="ac7bb53f-3ddc-43c3-a124-018177ab0681" providerId="ADAL" clId="{4A9E0824-8EE2-4813-AF4A-9ADB3938F59E}" dt="2022-03-23T05:05:12.892" v="432" actId="1076"/>
+          <ac:picMkLst>
+            <pc:docMk/>
+            <pc:sldMk cId="1286035323" sldId="264"/>
+            <ac:picMk id="7" creationId="{230FFE6A-228F-4874-80FC-E953455245CC}"/>
+          </ac:picMkLst>
+        </pc:picChg>
+      </pc:sldChg>
+      <pc:sldChg chg="addSp delSp modSp new mod setBg">
+        <pc:chgData name="Jonathon Sun" userId="ac7bb53f-3ddc-43c3-a124-018177ab0681" providerId="ADAL" clId="{4A9E0824-8EE2-4813-AF4A-9ADB3938F59E}" dt="2022-03-23T05:06:36.734" v="493" actId="20577"/>
+        <pc:sldMkLst>
+          <pc:docMk/>
+          <pc:sldMk cId="1352325898" sldId="265"/>
+        </pc:sldMkLst>
+        <pc:spChg chg="mod">
+          <ac:chgData name="Jonathon Sun" userId="ac7bb53f-3ddc-43c3-a124-018177ab0681" providerId="ADAL" clId="{4A9E0824-8EE2-4813-AF4A-9ADB3938F59E}" dt="2022-03-23T05:06:36.734" v="493" actId="20577"/>
+          <ac:spMkLst>
+            <pc:docMk/>
+            <pc:sldMk cId="1352325898" sldId="265"/>
+            <ac:spMk id="2" creationId="{7CBE5A30-5661-44F7-9FA5-C4A5A4EB5BD1}"/>
+          </ac:spMkLst>
+        </pc:spChg>
+        <pc:spChg chg="del">
+          <ac:chgData name="Jonathon Sun" userId="ac7bb53f-3ddc-43c3-a124-018177ab0681" providerId="ADAL" clId="{4A9E0824-8EE2-4813-AF4A-9ADB3938F59E}" dt="2022-03-23T05:06:18.068" v="473"/>
+          <ac:spMkLst>
+            <pc:docMk/>
+            <pc:sldMk cId="1352325898" sldId="265"/>
+            <ac:spMk id="3" creationId="{9D5AC8FD-227F-4A50-864F-5DF8DD99F3E7}"/>
+          </ac:spMkLst>
+        </pc:spChg>
+        <pc:spChg chg="add">
+          <ac:chgData name="Jonathon Sun" userId="ac7bb53f-3ddc-43c3-a124-018177ab0681" providerId="ADAL" clId="{4A9E0824-8EE2-4813-AF4A-9ADB3938F59E}" dt="2022-03-23T05:06:31.034" v="481" actId="26606"/>
+          <ac:spMkLst>
+            <pc:docMk/>
+            <pc:sldMk cId="1352325898" sldId="265"/>
+            <ac:spMk id="11" creationId="{D337A0A9-061E-7055-98D0-F989D5EAE979}"/>
+          </ac:spMkLst>
+        </pc:spChg>
+        <pc:spChg chg="add">
+          <ac:chgData name="Jonathon Sun" userId="ac7bb53f-3ddc-43c3-a124-018177ab0681" providerId="ADAL" clId="{4A9E0824-8EE2-4813-AF4A-9ADB3938F59E}" dt="2022-03-23T05:06:31.034" v="481" actId="26606"/>
+          <ac:spMkLst>
+            <pc:docMk/>
+            <pc:sldMk cId="1352325898" sldId="265"/>
+            <ac:spMk id="14" creationId="{F06B261F-632C-43DC-8DC7-7723B368270D}"/>
+          </ac:spMkLst>
+        </pc:spChg>
+        <pc:spChg chg="add">
+          <ac:chgData name="Jonathon Sun" userId="ac7bb53f-3ddc-43c3-a124-018177ab0681" providerId="ADAL" clId="{4A9E0824-8EE2-4813-AF4A-9ADB3938F59E}" dt="2022-03-23T05:06:31.034" v="481" actId="26606"/>
+          <ac:spMkLst>
+            <pc:docMk/>
+            <pc:sldMk cId="1352325898" sldId="265"/>
+            <ac:spMk id="16" creationId="{4E524C7F-EE50-42C5-9434-7C78CE04445B}"/>
+          </ac:spMkLst>
+        </pc:spChg>
+        <pc:picChg chg="add mod ord">
+          <ac:chgData name="Jonathon Sun" userId="ac7bb53f-3ddc-43c3-a124-018177ab0681" providerId="ADAL" clId="{4A9E0824-8EE2-4813-AF4A-9ADB3938F59E}" dt="2022-03-23T05:06:31.034" v="481" actId="26606"/>
+          <ac:picMkLst>
+            <pc:docMk/>
+            <pc:sldMk cId="1352325898" sldId="265"/>
+            <ac:picMk id="5" creationId="{A4BEC6F7-5120-4DB6-9DA9-AB493F8D2C07}"/>
+          </ac:picMkLst>
+        </pc:picChg>
+        <pc:picChg chg="add mod">
+          <ac:chgData name="Jonathon Sun" userId="ac7bb53f-3ddc-43c3-a124-018177ab0681" providerId="ADAL" clId="{4A9E0824-8EE2-4813-AF4A-9ADB3938F59E}" dt="2022-03-23T05:06:31.034" v="481" actId="26606"/>
+          <ac:picMkLst>
+            <pc:docMk/>
+            <pc:sldMk cId="1352325898" sldId="265"/>
+            <ac:picMk id="7" creationId="{49F08BB7-B9F8-4082-9EFB-47102A20F960}"/>
+          </ac:picMkLst>
+        </pc:picChg>
+      </pc:sldChg>
     </pc:docChg>
   </pc:docChgLst>
 </pc:chgInfo>
@@ -718,7 +1141,7 @@
           <a:p>
             <a:fld id="{92538219-6E45-4D12-B767-46F92D5844D4}" type="datetime1">
               <a:rPr lang="en-US" smtClean="0"/>
-              <a:t>2/8/2022</a:t>
+              <a:t>3/23/2022</a:t>
             </a:fld>
             <a:endParaRPr lang="en-US"/>
           </a:p>
@@ -916,7 +1339,7 @@
           <a:p>
             <a:fld id="{836430B8-6059-41E5-A5DC-C07A76F5859A}" type="datetime1">
               <a:rPr lang="en-US" smtClean="0"/>
-              <a:t>2/8/2022</a:t>
+              <a:t>3/23/2022</a:t>
             </a:fld>
             <a:endParaRPr lang="en-US"/>
           </a:p>
@@ -1178,7 +1601,7 @@
           <a:p>
             <a:fld id="{A09D0CB7-D16E-4358-B7F4-EA4A24554592}" type="datetime1">
               <a:rPr lang="en-US" smtClean="0"/>
-              <a:t>2/8/2022</a:t>
+              <a:t>3/23/2022</a:t>
             </a:fld>
             <a:endParaRPr lang="en-US"/>
           </a:p>
@@ -1394,7 +1817,7 @@
           <a:p>
             <a:fld id="{8BB296A2-D8F0-4E17-BFD0-A6C902250D59}" type="datetime1">
               <a:rPr lang="en-US" smtClean="0"/>
-              <a:t>2/8/2022</a:t>
+              <a:t>3/23/2022</a:t>
             </a:fld>
             <a:endParaRPr lang="en-US"/>
           </a:p>
@@ -1724,7 +2147,7 @@
           <a:p>
             <a:fld id="{D9108C9C-1ACB-4C84-A002-C7E0E45B937A}" type="datetime1">
               <a:rPr lang="en-US" smtClean="0"/>
-              <a:t>2/8/2022</a:t>
+              <a:t>3/23/2022</a:t>
             </a:fld>
             <a:endParaRPr lang="en-US"/>
           </a:p>
@@ -1997,7 +2420,7 @@
           <a:p>
             <a:fld id="{F49AF2A5-B297-4977-9E5B-4D3050E23689}" type="datetime1">
               <a:rPr lang="en-US" smtClean="0"/>
-              <a:t>2/8/2022</a:t>
+              <a:t>3/23/2022</a:t>
             </a:fld>
             <a:endParaRPr lang="en-US"/>
           </a:p>
@@ -2412,7 +2835,7 @@
           <a:p>
             <a:fld id="{70127434-4794-409A-9547-04789BA47588}" type="datetime1">
               <a:rPr lang="en-US" smtClean="0"/>
-              <a:t>2/8/2022</a:t>
+              <a:t>3/23/2022</a:t>
             </a:fld>
             <a:endParaRPr lang="en-US"/>
           </a:p>
@@ -2553,7 +2976,7 @@
           <a:p>
             <a:fld id="{85658635-357A-4E3D-B824-A5CEFDB8449C}" type="datetime1">
               <a:rPr lang="en-US" smtClean="0"/>
-              <a:t>2/8/2022</a:t>
+              <a:t>3/23/2022</a:t>
             </a:fld>
             <a:endParaRPr lang="en-US"/>
           </a:p>
@@ -2666,7 +3089,7 @@
           <a:p>
             <a:fld id="{7E86FF77-2719-4AD0-8740-0B90FF5D1EFB}" type="datetime1">
               <a:rPr lang="en-US" smtClean="0"/>
-              <a:t>2/8/2022</a:t>
+              <a:t>3/23/2022</a:t>
             </a:fld>
             <a:endParaRPr lang="en-US"/>
           </a:p>
@@ -3162,7 +3585,7 @@
           <a:p>
             <a:fld id="{6E441C83-1089-48B9-8B65-293D4C236D35}" type="datetime1">
               <a:rPr lang="en-US" smtClean="0"/>
-              <a:t>2/8/2022</a:t>
+              <a:t>3/23/2022</a:t>
             </a:fld>
             <a:endParaRPr lang="en-US"/>
           </a:p>
@@ -3638,7 +4061,7 @@
           <a:p>
             <a:fld id="{D162FE45-CC1E-47DB-8B82-6CF0636FBDB8}" type="datetime1">
               <a:rPr lang="en-US" smtClean="0"/>
-              <a:t>2/8/2022</a:t>
+              <a:t>3/23/2022</a:t>
             </a:fld>
             <a:endParaRPr lang="en-US"/>
           </a:p>
@@ -3933,7 +4356,7 @@
           <a:p>
             <a:fld id="{51FC8E16-3C03-4238-9C6F-B34F3D10F77E}" type="datetime1">
               <a:rPr lang="en-US" smtClean="0"/>
-              <a:t>2/8/2022</a:t>
+              <a:t>3/23/2022</a:t>
             </a:fld>
             <a:endParaRPr lang="en-US" dirty="0"/>
           </a:p>
@@ -4596,6 +5019,132 @@
 </p:sld>
 </file>
 
+<file path=ppt/slides/slide10.xml><?xml version="1.0" encoding="utf-8"?>
+<p:sld xmlns:a="http://schemas.openxmlformats.org/drawingml/2006/main" xmlns:r="http://schemas.openxmlformats.org/officeDocument/2006/relationships" xmlns:p="http://schemas.openxmlformats.org/presentationml/2006/main">
+  <p:cSld>
+    <p:spTree>
+      <p:nvGrpSpPr>
+        <p:cNvPr id="1" name=""/>
+        <p:cNvGrpSpPr/>
+        <p:nvPr/>
+      </p:nvGrpSpPr>
+      <p:grpSpPr>
+        <a:xfrm>
+          <a:off x="0" y="0"/>
+          <a:ext cx="0" cy="0"/>
+          <a:chOff x="0" y="0"/>
+          <a:chExt cx="0" cy="0"/>
+        </a:xfrm>
+      </p:grpSpPr>
+      <p:sp>
+        <p:nvSpPr>
+          <p:cNvPr id="2" name="Title 1">
+            <a:extLst>
+              <a:ext uri="{FF2B5EF4-FFF2-40B4-BE49-F238E27FC236}">
+                <a16:creationId xmlns:a16="http://schemas.microsoft.com/office/drawing/2014/main" id="{84A904A1-AC8F-4870-8278-A05A7872B41E}"/>
+              </a:ext>
+            </a:extLst>
+          </p:cNvPr>
+          <p:cNvSpPr>
+            <a:spLocks noGrp="1"/>
+          </p:cNvSpPr>
+          <p:nvPr>
+            <p:ph type="title"/>
+          </p:nvPr>
+        </p:nvSpPr>
+        <p:spPr/>
+        <p:txBody>
+          <a:bodyPr/>
+          <a:lstStyle/>
+          <a:p>
+            <a:endParaRPr lang="en-US"/>
+          </a:p>
+        </p:txBody>
+      </p:sp>
+      <p:pic>
+        <p:nvPicPr>
+          <p:cNvPr id="9" name="Content Placeholder 8" descr="Map&#10;&#10;Description automatically generated">
+            <a:extLst>
+              <a:ext uri="{FF2B5EF4-FFF2-40B4-BE49-F238E27FC236}">
+                <a16:creationId xmlns:a16="http://schemas.microsoft.com/office/drawing/2014/main" id="{CBAB2BE4-7B61-4D06-947B-CDA617D32957}"/>
+              </a:ext>
+            </a:extLst>
+          </p:cNvPr>
+          <p:cNvPicPr>
+            <a:picLocks noGrp="1" noChangeAspect="1"/>
+          </p:cNvPicPr>
+          <p:nvPr>
+            <p:ph idx="1"/>
+          </p:nvPr>
+        </p:nvPicPr>
+        <p:blipFill>
+          <a:blip r:embed="rId2">
+            <a:extLst>
+              <a:ext uri="{28A0092B-C50C-407E-A947-70E740481C1C}">
+                <a14:useLocalDpi xmlns:a14="http://schemas.microsoft.com/office/drawing/2010/main" val="0"/>
+              </a:ext>
+            </a:extLst>
+          </a:blip>
+          <a:stretch>
+            <a:fillRect/>
+          </a:stretch>
+        </p:blipFill>
+        <p:spPr>
+          <a:xfrm>
+            <a:off x="657111" y="2037281"/>
+            <a:ext cx="4652865" cy="4652865"/>
+          </a:xfrm>
+        </p:spPr>
+      </p:pic>
+      <p:pic>
+        <p:nvPicPr>
+          <p:cNvPr id="11" name="Picture 10" descr="Map&#10;&#10;Description automatically generated">
+            <a:extLst>
+              <a:ext uri="{FF2B5EF4-FFF2-40B4-BE49-F238E27FC236}">
+                <a16:creationId xmlns:a16="http://schemas.microsoft.com/office/drawing/2014/main" id="{FFCC5D69-F873-4230-BD84-699A7E9D79EE}"/>
+              </a:ext>
+            </a:extLst>
+          </p:cNvPr>
+          <p:cNvPicPr>
+            <a:picLocks noChangeAspect="1"/>
+          </p:cNvPicPr>
+          <p:nvPr/>
+        </p:nvPicPr>
+        <p:blipFill>
+          <a:blip r:embed="rId3">
+            <a:extLst>
+              <a:ext uri="{28A0092B-C50C-407E-A947-70E740481C1C}">
+                <a14:useLocalDpi xmlns:a14="http://schemas.microsoft.com/office/drawing/2010/main" val="0"/>
+              </a:ext>
+            </a:extLst>
+          </a:blip>
+          <a:stretch>
+            <a:fillRect/>
+          </a:stretch>
+        </p:blipFill>
+        <p:spPr>
+          <a:xfrm>
+            <a:off x="6096000" y="2037281"/>
+            <a:ext cx="4652865" cy="4652865"/>
+          </a:xfrm>
+          <a:prstGeom prst="rect">
+            <a:avLst/>
+          </a:prstGeom>
+        </p:spPr>
+      </p:pic>
+    </p:spTree>
+    <p:extLst>
+      <p:ext uri="{BB962C8B-B14F-4D97-AF65-F5344CB8AC3E}">
+        <p14:creationId xmlns:p14="http://schemas.microsoft.com/office/powerpoint/2010/main" val="1888975568"/>
+      </p:ext>
+    </p:extLst>
+  </p:cSld>
+  <p:clrMapOvr>
+    <a:masterClrMapping/>
+  </p:clrMapOvr>
+</p:sld>
+</file>
+
 <file path=ppt/slides/slide2.xml><?xml version="1.0" encoding="utf-8"?>
 <p:sld xmlns:a="http://schemas.openxmlformats.org/drawingml/2006/main" xmlns:r="http://schemas.openxmlformats.org/officeDocument/2006/relationships" xmlns:p="http://schemas.openxmlformats.org/presentationml/2006/main">
   <p:cSld>
@@ -4634,7 +5183,10 @@
           <a:bodyPr/>
           <a:lstStyle/>
           <a:p>
-            <a:endParaRPr lang="en-US"/>
+            <a:r>
+              <a:rPr lang="en-US" dirty="0"/>
+              <a:t>Overview</a:t>
+            </a:r>
           </a:p>
         </p:txBody>
       </p:sp>
@@ -4659,6 +5211,70 @@
           <a:bodyPr/>
           <a:lstStyle/>
           <a:p>
+            <a:pPr marL="342900" indent="-342900">
+              <a:buFont typeface="Arial" panose="020B0604020202020204" pitchFamily="34" charset="0"/>
+              <a:buChar char="•"/>
+            </a:pPr>
+            <a:r>
+              <a:rPr lang="en-US" dirty="0"/>
+              <a:t>Literature Review</a:t>
+            </a:r>
+          </a:p>
+          <a:p>
+            <a:pPr marL="342900" indent="-342900">
+              <a:buFont typeface="Arial" panose="020B0604020202020204" pitchFamily="34" charset="0"/>
+              <a:buChar char="•"/>
+            </a:pPr>
+            <a:r>
+              <a:rPr lang="en-US" dirty="0"/>
+              <a:t>Framework</a:t>
+            </a:r>
+          </a:p>
+          <a:p>
+            <a:pPr marL="342900" indent="-342900">
+              <a:buFont typeface="Arial" panose="020B0604020202020204" pitchFamily="34" charset="0"/>
+              <a:buChar char="•"/>
+            </a:pPr>
+            <a:r>
+              <a:rPr lang="en-US" dirty="0"/>
+              <a:t>Methodology and data</a:t>
+            </a:r>
+          </a:p>
+          <a:p>
+            <a:pPr marL="342900" indent="-342900">
+              <a:buFont typeface="Arial" panose="020B0604020202020204" pitchFamily="34" charset="0"/>
+              <a:buChar char="•"/>
+            </a:pPr>
+            <a:r>
+              <a:rPr lang="en-US" dirty="0"/>
+              <a:t>Analysis</a:t>
+            </a:r>
+          </a:p>
+          <a:p>
+            <a:pPr marL="342900" indent="-342900">
+              <a:buFont typeface="Arial" panose="020B0604020202020204" pitchFamily="34" charset="0"/>
+              <a:buChar char="•"/>
+            </a:pPr>
+            <a:r>
+              <a:rPr lang="en-US" dirty="0"/>
+              <a:t>Findings and conclusions</a:t>
+            </a:r>
+          </a:p>
+          <a:p>
+            <a:pPr marL="342900" indent="-342900">
+              <a:buFont typeface="Arial" panose="020B0604020202020204" pitchFamily="34" charset="0"/>
+              <a:buChar char="•"/>
+            </a:pPr>
+            <a:r>
+              <a:rPr lang="en-US" dirty="0"/>
+              <a:t>Implications</a:t>
+            </a:r>
+          </a:p>
+          <a:p>
+            <a:pPr marL="342900" indent="-342900">
+              <a:buFont typeface="Arial" panose="020B0604020202020204" pitchFamily="34" charset="0"/>
+              <a:buChar char="•"/>
+            </a:pPr>
             <a:endParaRPr lang="en-US" dirty="0"/>
           </a:p>
         </p:txBody>
@@ -4667,6 +5283,2256 @@
     <p:extLst>
       <p:ext uri="{BB962C8B-B14F-4D97-AF65-F5344CB8AC3E}">
         <p14:creationId xmlns:p14="http://schemas.microsoft.com/office/powerpoint/2010/main" val="605034550"/>
+      </p:ext>
+    </p:extLst>
+  </p:cSld>
+  <p:clrMapOvr>
+    <a:masterClrMapping/>
+  </p:clrMapOvr>
+</p:sld>
+</file>
+
+<file path=ppt/slides/slide3.xml><?xml version="1.0" encoding="utf-8"?>
+<p:sld xmlns:a="http://schemas.openxmlformats.org/drawingml/2006/main" xmlns:r="http://schemas.openxmlformats.org/officeDocument/2006/relationships" xmlns:p="http://schemas.openxmlformats.org/presentationml/2006/main">
+  <p:cSld>
+    <p:spTree>
+      <p:nvGrpSpPr>
+        <p:cNvPr id="1" name=""/>
+        <p:cNvGrpSpPr/>
+        <p:nvPr/>
+      </p:nvGrpSpPr>
+      <p:grpSpPr>
+        <a:xfrm>
+          <a:off x="0" y="0"/>
+          <a:ext cx="0" cy="0"/>
+          <a:chOff x="0" y="0"/>
+          <a:chExt cx="0" cy="0"/>
+        </a:xfrm>
+      </p:grpSpPr>
+      <p:sp>
+        <p:nvSpPr>
+          <p:cNvPr id="2" name="Title 1">
+            <a:extLst>
+              <a:ext uri="{FF2B5EF4-FFF2-40B4-BE49-F238E27FC236}">
+                <a16:creationId xmlns:a16="http://schemas.microsoft.com/office/drawing/2014/main" id="{833A95E3-FC85-4224-B40C-3A06DA2FF671}"/>
+              </a:ext>
+            </a:extLst>
+          </p:cNvPr>
+          <p:cNvSpPr>
+            <a:spLocks noGrp="1"/>
+          </p:cNvSpPr>
+          <p:nvPr>
+            <p:ph type="title"/>
+          </p:nvPr>
+        </p:nvSpPr>
+        <p:spPr/>
+        <p:txBody>
+          <a:bodyPr/>
+          <a:lstStyle/>
+          <a:p>
+            <a:r>
+              <a:rPr lang="en-US" dirty="0"/>
+              <a:t>Literature Review</a:t>
+            </a:r>
+          </a:p>
+        </p:txBody>
+      </p:sp>
+      <p:sp>
+        <p:nvSpPr>
+          <p:cNvPr id="3" name="Content Placeholder 2">
+            <a:extLst>
+              <a:ext uri="{FF2B5EF4-FFF2-40B4-BE49-F238E27FC236}">
+                <a16:creationId xmlns:a16="http://schemas.microsoft.com/office/drawing/2014/main" id="{E29DA367-DF65-4F14-A717-65E356E8E284}"/>
+              </a:ext>
+            </a:extLst>
+          </p:cNvPr>
+          <p:cNvSpPr>
+            <a:spLocks noGrp="1"/>
+          </p:cNvSpPr>
+          <p:nvPr>
+            <p:ph idx="1"/>
+          </p:nvPr>
+        </p:nvSpPr>
+        <p:spPr/>
+        <p:txBody>
+          <a:bodyPr/>
+          <a:lstStyle/>
+          <a:p>
+            <a:r>
+              <a:rPr lang="en-US" dirty="0"/>
+              <a:t>Asian American Geography</a:t>
+            </a:r>
+          </a:p>
+          <a:p>
+            <a:endParaRPr lang="en-US" dirty="0"/>
+          </a:p>
+        </p:txBody>
+      </p:sp>
+    </p:spTree>
+    <p:extLst>
+      <p:ext uri="{BB962C8B-B14F-4D97-AF65-F5344CB8AC3E}">
+        <p14:creationId xmlns:p14="http://schemas.microsoft.com/office/powerpoint/2010/main" val="1230411320"/>
+      </p:ext>
+    </p:extLst>
+  </p:cSld>
+  <p:clrMapOvr>
+    <a:masterClrMapping/>
+  </p:clrMapOvr>
+</p:sld>
+</file>
+
+<file path=ppt/slides/slide4.xml><?xml version="1.0" encoding="utf-8"?>
+<p:sld xmlns:a="http://schemas.openxmlformats.org/drawingml/2006/main" xmlns:r="http://schemas.openxmlformats.org/officeDocument/2006/relationships" xmlns:p="http://schemas.openxmlformats.org/presentationml/2006/main">
+  <p:cSld>
+    <p:spTree>
+      <p:nvGrpSpPr>
+        <p:cNvPr id="1" name=""/>
+        <p:cNvGrpSpPr/>
+        <p:nvPr/>
+      </p:nvGrpSpPr>
+      <p:grpSpPr>
+        <a:xfrm>
+          <a:off x="0" y="0"/>
+          <a:ext cx="0" cy="0"/>
+          <a:chOff x="0" y="0"/>
+          <a:chExt cx="0" cy="0"/>
+        </a:xfrm>
+      </p:grpSpPr>
+      <p:sp>
+        <p:nvSpPr>
+          <p:cNvPr id="2" name="Title 1">
+            <a:extLst>
+              <a:ext uri="{FF2B5EF4-FFF2-40B4-BE49-F238E27FC236}">
+                <a16:creationId xmlns:a16="http://schemas.microsoft.com/office/drawing/2014/main" id="{C84D344F-ED74-4E11-B51F-FE6CA5C3000A}"/>
+              </a:ext>
+            </a:extLst>
+          </p:cNvPr>
+          <p:cNvSpPr>
+            <a:spLocks noGrp="1"/>
+          </p:cNvSpPr>
+          <p:nvPr>
+            <p:ph type="title"/>
+          </p:nvPr>
+        </p:nvSpPr>
+        <p:spPr/>
+        <p:txBody>
+          <a:bodyPr/>
+          <a:lstStyle/>
+          <a:p>
+            <a:endParaRPr lang="en-US"/>
+          </a:p>
+        </p:txBody>
+      </p:sp>
+      <p:sp>
+        <p:nvSpPr>
+          <p:cNvPr id="3" name="Content Placeholder 2">
+            <a:extLst>
+              <a:ext uri="{FF2B5EF4-FFF2-40B4-BE49-F238E27FC236}">
+                <a16:creationId xmlns:a16="http://schemas.microsoft.com/office/drawing/2014/main" id="{3F687EF0-87E4-43DA-B47A-4399121C3BDA}"/>
+              </a:ext>
+            </a:extLst>
+          </p:cNvPr>
+          <p:cNvSpPr>
+            <a:spLocks noGrp="1"/>
+          </p:cNvSpPr>
+          <p:nvPr>
+            <p:ph idx="1"/>
+          </p:nvPr>
+        </p:nvSpPr>
+        <p:spPr/>
+        <p:txBody>
+          <a:bodyPr/>
+          <a:lstStyle/>
+          <a:p>
+            <a:endParaRPr lang="en-US"/>
+          </a:p>
+        </p:txBody>
+      </p:sp>
+    </p:spTree>
+    <p:extLst>
+      <p:ext uri="{BB962C8B-B14F-4D97-AF65-F5344CB8AC3E}">
+        <p14:creationId xmlns:p14="http://schemas.microsoft.com/office/powerpoint/2010/main" val="3062073168"/>
+      </p:ext>
+    </p:extLst>
+  </p:cSld>
+  <p:clrMapOvr>
+    <a:masterClrMapping/>
+  </p:clrMapOvr>
+</p:sld>
+</file>
+
+<file path=ppt/slides/slide5.xml><?xml version="1.0" encoding="utf-8"?>
+<p:sld xmlns:a="http://schemas.openxmlformats.org/drawingml/2006/main" xmlns:r="http://schemas.openxmlformats.org/officeDocument/2006/relationships" xmlns:p="http://schemas.openxmlformats.org/presentationml/2006/main">
+  <p:cSld>
+    <p:spTree>
+      <p:nvGrpSpPr>
+        <p:cNvPr id="1" name=""/>
+        <p:cNvGrpSpPr/>
+        <p:nvPr/>
+      </p:nvGrpSpPr>
+      <p:grpSpPr>
+        <a:xfrm>
+          <a:off x="0" y="0"/>
+          <a:ext cx="0" cy="0"/>
+          <a:chOff x="0" y="0"/>
+          <a:chExt cx="0" cy="0"/>
+        </a:xfrm>
+      </p:grpSpPr>
+      <p:sp>
+        <p:nvSpPr>
+          <p:cNvPr id="2" name="Title 1">
+            <a:extLst>
+              <a:ext uri="{FF2B5EF4-FFF2-40B4-BE49-F238E27FC236}">
+                <a16:creationId xmlns:a16="http://schemas.microsoft.com/office/drawing/2014/main" id="{143BE065-7EA7-43E3-BBF4-94DEAE14615A}"/>
+              </a:ext>
+            </a:extLst>
+          </p:cNvPr>
+          <p:cNvSpPr>
+            <a:spLocks noGrp="1"/>
+          </p:cNvSpPr>
+          <p:nvPr>
+            <p:ph type="title"/>
+          </p:nvPr>
+        </p:nvSpPr>
+        <p:spPr/>
+        <p:txBody>
+          <a:bodyPr>
+            <a:normAutofit fontScale="90000"/>
+          </a:bodyPr>
+          <a:lstStyle/>
+          <a:p>
+            <a:r>
+              <a:rPr lang="en-US" dirty="0"/>
+              <a:t>Framework: Critical Geographic College Access</a:t>
+            </a:r>
+          </a:p>
+        </p:txBody>
+      </p:sp>
+      <p:sp>
+        <p:nvSpPr>
+          <p:cNvPr id="3" name="Content Placeholder 2">
+            <a:extLst>
+              <a:ext uri="{FF2B5EF4-FFF2-40B4-BE49-F238E27FC236}">
+                <a16:creationId xmlns:a16="http://schemas.microsoft.com/office/drawing/2014/main" id="{A8210CA2-232C-4240-9A57-F1DA2626061B}"/>
+              </a:ext>
+            </a:extLst>
+          </p:cNvPr>
+          <p:cNvSpPr>
+            <a:spLocks noGrp="1"/>
+          </p:cNvSpPr>
+          <p:nvPr>
+            <p:ph idx="1"/>
+          </p:nvPr>
+        </p:nvSpPr>
+        <p:spPr/>
+        <p:txBody>
+          <a:bodyPr/>
+          <a:lstStyle/>
+          <a:p>
+            <a:r>
+              <a:rPr lang="en-US" dirty="0"/>
+              <a:t>(Dache, 2021)</a:t>
+            </a:r>
+          </a:p>
+        </p:txBody>
+      </p:sp>
+    </p:spTree>
+    <p:extLst>
+      <p:ext uri="{BB962C8B-B14F-4D97-AF65-F5344CB8AC3E}">
+        <p14:creationId xmlns:p14="http://schemas.microsoft.com/office/powerpoint/2010/main" val="3886972306"/>
+      </p:ext>
+    </p:extLst>
+  </p:cSld>
+  <p:clrMapOvr>
+    <a:masterClrMapping/>
+  </p:clrMapOvr>
+</p:sld>
+</file>
+
+<file path=ppt/slides/slide6.xml><?xml version="1.0" encoding="utf-8"?>
+<p:sld xmlns:a="http://schemas.openxmlformats.org/drawingml/2006/main" xmlns:r="http://schemas.openxmlformats.org/officeDocument/2006/relationships" xmlns:p="http://schemas.openxmlformats.org/presentationml/2006/main">
+  <p:cSld>
+    <p:spTree>
+      <p:nvGrpSpPr>
+        <p:cNvPr id="1" name=""/>
+        <p:cNvGrpSpPr/>
+        <p:nvPr/>
+      </p:nvGrpSpPr>
+      <p:grpSpPr>
+        <a:xfrm>
+          <a:off x="0" y="0"/>
+          <a:ext cx="0" cy="0"/>
+          <a:chOff x="0" y="0"/>
+          <a:chExt cx="0" cy="0"/>
+        </a:xfrm>
+      </p:grpSpPr>
+      <p:sp>
+        <p:nvSpPr>
+          <p:cNvPr id="2" name="Title 1">
+            <a:extLst>
+              <a:ext uri="{FF2B5EF4-FFF2-40B4-BE49-F238E27FC236}">
+                <a16:creationId xmlns:a16="http://schemas.microsoft.com/office/drawing/2014/main" id="{2995FD44-2C81-4706-BB60-DADE730E76FD}"/>
+              </a:ext>
+            </a:extLst>
+          </p:cNvPr>
+          <p:cNvSpPr>
+            <a:spLocks noGrp="1"/>
+          </p:cNvSpPr>
+          <p:nvPr>
+            <p:ph type="title"/>
+          </p:nvPr>
+        </p:nvSpPr>
+        <p:spPr/>
+        <p:txBody>
+          <a:bodyPr/>
+          <a:lstStyle/>
+          <a:p>
+            <a:r>
+              <a:rPr lang="en-US" dirty="0"/>
+              <a:t>List of Methods</a:t>
+            </a:r>
+          </a:p>
+        </p:txBody>
+      </p:sp>
+      <p:sp>
+        <p:nvSpPr>
+          <p:cNvPr id="3" name="Content Placeholder 2">
+            <a:extLst>
+              <a:ext uri="{FF2B5EF4-FFF2-40B4-BE49-F238E27FC236}">
+                <a16:creationId xmlns:a16="http://schemas.microsoft.com/office/drawing/2014/main" id="{EF982DE6-B922-4713-B2EB-88A480F6A7A2}"/>
+              </a:ext>
+            </a:extLst>
+          </p:cNvPr>
+          <p:cNvSpPr>
+            <a:spLocks noGrp="1"/>
+          </p:cNvSpPr>
+          <p:nvPr>
+            <p:ph idx="1"/>
+          </p:nvPr>
+        </p:nvSpPr>
+        <p:spPr/>
+        <p:txBody>
+          <a:bodyPr/>
+          <a:lstStyle/>
+          <a:p>
+            <a:r>
+              <a:rPr lang="en-US" dirty="0"/>
+              <a:t>Moran’s I</a:t>
+            </a:r>
+          </a:p>
+          <a:p>
+            <a:r>
+              <a:rPr lang="en-US" dirty="0"/>
+              <a:t>Local Moran’s I</a:t>
+            </a:r>
+          </a:p>
+          <a:p>
+            <a:r>
+              <a:rPr lang="en-US" dirty="0"/>
+              <a:t>Nearest Neighbor Analysis</a:t>
+            </a:r>
+          </a:p>
+        </p:txBody>
+      </p:sp>
+    </p:spTree>
+    <p:extLst>
+      <p:ext uri="{BB962C8B-B14F-4D97-AF65-F5344CB8AC3E}">
+        <p14:creationId xmlns:p14="http://schemas.microsoft.com/office/powerpoint/2010/main" val="2876830951"/>
+      </p:ext>
+    </p:extLst>
+  </p:cSld>
+  <p:clrMapOvr>
+    <a:masterClrMapping/>
+  </p:clrMapOvr>
+</p:sld>
+</file>
+
+<file path=ppt/slides/slide7.xml><?xml version="1.0" encoding="utf-8"?>
+<p:sld xmlns:a="http://schemas.openxmlformats.org/drawingml/2006/main" xmlns:r="http://schemas.openxmlformats.org/officeDocument/2006/relationships" xmlns:p="http://schemas.openxmlformats.org/presentationml/2006/main">
+  <p:cSld>
+    <p:bg>
+      <p:bgPr>
+        <a:solidFill>
+          <a:schemeClr val="bg1"/>
+        </a:solidFill>
+        <a:effectLst/>
+      </p:bgPr>
+    </p:bg>
+    <p:spTree>
+      <p:nvGrpSpPr>
+        <p:cNvPr id="1" name=""/>
+        <p:cNvGrpSpPr/>
+        <p:nvPr/>
+      </p:nvGrpSpPr>
+      <p:grpSpPr>
+        <a:xfrm>
+          <a:off x="0" y="0"/>
+          <a:ext cx="0" cy="0"/>
+          <a:chOff x="0" y="0"/>
+          <a:chExt cx="0" cy="0"/>
+        </a:xfrm>
+      </p:grpSpPr>
+      <p:sp useBgFill="1">
+        <p:nvSpPr>
+          <p:cNvPr id="14" name="Rectangle 13">
+            <a:extLst>
+              <a:ext uri="{FF2B5EF4-FFF2-40B4-BE49-F238E27FC236}">
+                <a16:creationId xmlns:a16="http://schemas.microsoft.com/office/drawing/2014/main" id="{F06B261F-632C-43DC-8DC7-7723B368270D}"/>
+              </a:ext>
+              <a:ext uri="{C183D7F6-B498-43B3-948B-1728B52AA6E4}">
+                <adec:decorative xmlns:adec="http://schemas.microsoft.com/office/drawing/2017/decorative" val="1"/>
+              </a:ext>
+            </a:extLst>
+          </p:cNvPr>
+          <p:cNvSpPr>
+            <a:spLocks noGrp="1" noRot="1" noChangeAspect="1" noMove="1" noResize="1" noEditPoints="1" noAdjustHandles="1" noChangeArrowheads="1" noChangeShapeType="1" noTextEdit="1"/>
+          </p:cNvSpPr>
+          <p:nvPr>
+            <p:extLst>
+              <p:ext uri="{386F3935-93C4-4BCD-93E2-E3B085C9AB24}">
+                <p16:designElem xmlns:p16="http://schemas.microsoft.com/office/powerpoint/2015/main" val="1"/>
+              </p:ext>
+            </p:extLst>
+          </p:nvPr>
+        </p:nvSpPr>
+        <p:spPr>
+          <a:xfrm>
+            <a:off x="0" y="0"/>
+            <a:ext cx="12192000" cy="6858000"/>
+          </a:xfrm>
+          <a:prstGeom prst="rect">
+            <a:avLst/>
+          </a:prstGeom>
+          <a:ln>
+            <a:noFill/>
+          </a:ln>
+        </p:spPr>
+        <p:style>
+          <a:lnRef idx="2">
+            <a:schemeClr val="accent1">
+              <a:shade val="50000"/>
+            </a:schemeClr>
+          </a:lnRef>
+          <a:fillRef idx="1">
+            <a:schemeClr val="accent1"/>
+          </a:fillRef>
+          <a:effectRef idx="0">
+            <a:schemeClr val="accent1"/>
+          </a:effectRef>
+          <a:fontRef idx="minor">
+            <a:schemeClr val="lt1"/>
+          </a:fontRef>
+        </p:style>
+        <p:txBody>
+          <a:bodyPr rtlCol="0" anchor="ctr"/>
+          <a:lstStyle/>
+          <a:p>
+            <a:pPr algn="ctr"/>
+            <a:endParaRPr lang="en-US"/>
+          </a:p>
+        </p:txBody>
+      </p:sp>
+      <p:sp>
+        <p:nvSpPr>
+          <p:cNvPr id="16" name="Rectangle 15">
+            <a:extLst>
+              <a:ext uri="{FF2B5EF4-FFF2-40B4-BE49-F238E27FC236}">
+                <a16:creationId xmlns:a16="http://schemas.microsoft.com/office/drawing/2014/main" id="{4E524C7F-EE50-42C5-9434-7C78CE04445B}"/>
+              </a:ext>
+              <a:ext uri="{C183D7F6-B498-43B3-948B-1728B52AA6E4}">
+                <adec:decorative xmlns:adec="http://schemas.microsoft.com/office/drawing/2017/decorative" val="1"/>
+              </a:ext>
+            </a:extLst>
+          </p:cNvPr>
+          <p:cNvSpPr>
+            <a:spLocks noGrp="1" noRot="1" noChangeAspect="1" noMove="1" noResize="1" noEditPoints="1" noAdjustHandles="1" noChangeArrowheads="1" noChangeShapeType="1" noTextEdit="1"/>
+          </p:cNvSpPr>
+          <p:nvPr>
+            <p:extLst>
+              <p:ext uri="{386F3935-93C4-4BCD-93E2-E3B085C9AB24}">
+                <p16:designElem xmlns:p16="http://schemas.microsoft.com/office/powerpoint/2015/main" val="1"/>
+              </p:ext>
+            </p:extLst>
+          </p:nvPr>
+        </p:nvSpPr>
+        <p:spPr>
+          <a:xfrm>
+            <a:off x="0" y="0"/>
+            <a:ext cx="6083644" cy="6861333"/>
+          </a:xfrm>
+          <a:prstGeom prst="rect">
+            <a:avLst/>
+          </a:prstGeom>
+          <a:solidFill>
+            <a:schemeClr val="tx2"/>
+          </a:solidFill>
+          <a:ln>
+            <a:noFill/>
+          </a:ln>
+        </p:spPr>
+        <p:style>
+          <a:lnRef idx="2">
+            <a:schemeClr val="accent1">
+              <a:shade val="50000"/>
+            </a:schemeClr>
+          </a:lnRef>
+          <a:fillRef idx="1">
+            <a:schemeClr val="accent1"/>
+          </a:fillRef>
+          <a:effectRef idx="0">
+            <a:schemeClr val="accent1"/>
+          </a:effectRef>
+          <a:fontRef idx="minor">
+            <a:schemeClr val="lt1"/>
+          </a:fontRef>
+        </p:style>
+        <p:txBody>
+          <a:bodyPr rtlCol="0" anchor="ctr"/>
+          <a:lstStyle/>
+          <a:p>
+            <a:pPr algn="ctr"/>
+            <a:endParaRPr lang="en-US"/>
+          </a:p>
+        </p:txBody>
+      </p:sp>
+      <p:sp>
+        <p:nvSpPr>
+          <p:cNvPr id="2" name="Title 1">
+            <a:extLst>
+              <a:ext uri="{FF2B5EF4-FFF2-40B4-BE49-F238E27FC236}">
+                <a16:creationId xmlns:a16="http://schemas.microsoft.com/office/drawing/2014/main" id="{7CBE5A30-5661-44F7-9FA5-C4A5A4EB5BD1}"/>
+              </a:ext>
+            </a:extLst>
+          </p:cNvPr>
+          <p:cNvSpPr>
+            <a:spLocks noGrp="1"/>
+          </p:cNvSpPr>
+          <p:nvPr>
+            <p:ph type="title"/>
+          </p:nvPr>
+        </p:nvSpPr>
+        <p:spPr>
+          <a:xfrm>
+            <a:off x="484552" y="365125"/>
+            <a:ext cx="5022630" cy="2430030"/>
+          </a:xfrm>
+        </p:spPr>
+        <p:txBody>
+          <a:bodyPr>
+            <a:normAutofit/>
+          </a:bodyPr>
+          <a:lstStyle/>
+          <a:p>
+            <a:r>
+              <a:rPr lang="en-US" dirty="0" err="1"/>
+              <a:t>Morean’s</a:t>
+            </a:r>
+            <a:r>
+              <a:rPr lang="en-US" dirty="0"/>
+              <a:t> I</a:t>
+            </a:r>
+          </a:p>
+        </p:txBody>
+      </p:sp>
+      <p:sp>
+        <p:nvSpPr>
+          <p:cNvPr id="11" name="Content Placeholder 10">
+            <a:extLst>
+              <a:ext uri="{FF2B5EF4-FFF2-40B4-BE49-F238E27FC236}">
+                <a16:creationId xmlns:a16="http://schemas.microsoft.com/office/drawing/2014/main" id="{D337A0A9-061E-7055-98D0-F989D5EAE979}"/>
+              </a:ext>
+            </a:extLst>
+          </p:cNvPr>
+          <p:cNvSpPr>
+            <a:spLocks noGrp="1"/>
+          </p:cNvSpPr>
+          <p:nvPr>
+            <p:ph idx="1"/>
+          </p:nvPr>
+        </p:nvSpPr>
+        <p:spPr>
+          <a:xfrm>
+            <a:off x="484552" y="3054927"/>
+            <a:ext cx="5022630" cy="3122036"/>
+          </a:xfrm>
+        </p:spPr>
+        <p:txBody>
+          <a:bodyPr>
+            <a:normAutofit/>
+          </a:bodyPr>
+          <a:lstStyle/>
+          <a:p>
+            <a:endParaRPr lang="en-US">
+              <a:solidFill>
+                <a:schemeClr val="bg1"/>
+              </a:solidFill>
+            </a:endParaRPr>
+          </a:p>
+        </p:txBody>
+      </p:sp>
+      <p:pic>
+        <p:nvPicPr>
+          <p:cNvPr id="7" name="Picture 6" descr="Map&#10;&#10;Description automatically generated">
+            <a:extLst>
+              <a:ext uri="{FF2B5EF4-FFF2-40B4-BE49-F238E27FC236}">
+                <a16:creationId xmlns:a16="http://schemas.microsoft.com/office/drawing/2014/main" id="{49F08BB7-B9F8-4082-9EFB-47102A20F960}"/>
+              </a:ext>
+            </a:extLst>
+          </p:cNvPr>
+          <p:cNvPicPr>
+            <a:picLocks noChangeAspect="1"/>
+          </p:cNvPicPr>
+          <p:nvPr/>
+        </p:nvPicPr>
+        <p:blipFill>
+          <a:blip r:embed="rId2">
+            <a:extLst>
+              <a:ext uri="{28A0092B-C50C-407E-A947-70E740481C1C}">
+                <a14:useLocalDpi xmlns:a14="http://schemas.microsoft.com/office/drawing/2010/main" val="0"/>
+              </a:ext>
+            </a:extLst>
+          </a:blip>
+          <a:stretch>
+            <a:fillRect/>
+          </a:stretch>
+        </p:blipFill>
+        <p:spPr>
+          <a:xfrm>
+            <a:off x="7218536" y="439783"/>
+            <a:ext cx="3838571" cy="2724942"/>
+          </a:xfrm>
+          <a:prstGeom prst="rect">
+            <a:avLst/>
+          </a:prstGeom>
+        </p:spPr>
+      </p:pic>
+      <p:pic>
+        <p:nvPicPr>
+          <p:cNvPr id="5" name="Content Placeholder 4" descr="Map&#10;&#10;Description automatically generated">
+            <a:extLst>
+              <a:ext uri="{FF2B5EF4-FFF2-40B4-BE49-F238E27FC236}">
+                <a16:creationId xmlns:a16="http://schemas.microsoft.com/office/drawing/2014/main" id="{A4BEC6F7-5120-4DB6-9DA9-AB493F8D2C07}"/>
+              </a:ext>
+            </a:extLst>
+          </p:cNvPr>
+          <p:cNvPicPr>
+            <a:picLocks noChangeAspect="1"/>
+          </p:cNvPicPr>
+          <p:nvPr/>
+        </p:nvPicPr>
+        <p:blipFill>
+          <a:blip r:embed="rId3">
+            <a:extLst>
+              <a:ext uri="{28A0092B-C50C-407E-A947-70E740481C1C}">
+                <a14:useLocalDpi xmlns:a14="http://schemas.microsoft.com/office/drawing/2010/main" val="0"/>
+              </a:ext>
+            </a:extLst>
+          </a:blip>
+          <a:stretch>
+            <a:fillRect/>
+          </a:stretch>
+        </p:blipFill>
+        <p:spPr>
+          <a:xfrm>
+            <a:off x="7218536" y="3503659"/>
+            <a:ext cx="3838571" cy="2724942"/>
+          </a:xfrm>
+          <a:prstGeom prst="rect">
+            <a:avLst/>
+          </a:prstGeom>
+        </p:spPr>
+      </p:pic>
+    </p:spTree>
+    <p:extLst>
+      <p:ext uri="{BB962C8B-B14F-4D97-AF65-F5344CB8AC3E}">
+        <p14:creationId xmlns:p14="http://schemas.microsoft.com/office/powerpoint/2010/main" val="1352325898"/>
+      </p:ext>
+    </p:extLst>
+  </p:cSld>
+  <p:clrMapOvr>
+    <a:masterClrMapping/>
+  </p:clrMapOvr>
+</p:sld>
+</file>
+
+<file path=ppt/slides/slide8.xml><?xml version="1.0" encoding="utf-8"?>
+<p:sld xmlns:a="http://schemas.openxmlformats.org/drawingml/2006/main" xmlns:r="http://schemas.openxmlformats.org/officeDocument/2006/relationships" xmlns:p="http://schemas.openxmlformats.org/presentationml/2006/main">
+  <p:cSld>
+    <p:bg>
+      <p:bgPr>
+        <a:solidFill>
+          <a:schemeClr val="bg1"/>
+        </a:solidFill>
+        <a:effectLst/>
+      </p:bgPr>
+    </p:bg>
+    <p:spTree>
+      <p:nvGrpSpPr>
+        <p:cNvPr id="1" name=""/>
+        <p:cNvGrpSpPr/>
+        <p:nvPr/>
+      </p:nvGrpSpPr>
+      <p:grpSpPr>
+        <a:xfrm>
+          <a:off x="0" y="0"/>
+          <a:ext cx="0" cy="0"/>
+          <a:chOff x="0" y="0"/>
+          <a:chExt cx="0" cy="0"/>
+        </a:xfrm>
+      </p:grpSpPr>
+      <p:sp>
+        <p:nvSpPr>
+          <p:cNvPr id="12" name="Rectangle 11">
+            <a:extLst>
+              <a:ext uri="{FF2B5EF4-FFF2-40B4-BE49-F238E27FC236}">
+                <a16:creationId xmlns:a16="http://schemas.microsoft.com/office/drawing/2014/main" id="{50666DC1-CD27-4874-9484-9D06C59FE4D0}"/>
+              </a:ext>
+              <a:ext uri="{C183D7F6-B498-43B3-948B-1728B52AA6E4}">
+                <adec:decorative xmlns:adec="http://schemas.microsoft.com/office/drawing/2017/decorative" val="1"/>
+              </a:ext>
+            </a:extLst>
+          </p:cNvPr>
+          <p:cNvSpPr>
+            <a:spLocks noGrp="1" noRot="1" noChangeAspect="1" noMove="1" noResize="1" noEditPoints="1" noAdjustHandles="1" noChangeArrowheads="1" noChangeShapeType="1" noTextEdit="1"/>
+          </p:cNvSpPr>
+          <p:nvPr>
+            <p:extLst>
+              <p:ext uri="{386F3935-93C4-4BCD-93E2-E3B085C9AB24}">
+                <p16:designElem xmlns:p16="http://schemas.microsoft.com/office/powerpoint/2015/main" val="1"/>
+              </p:ext>
+            </p:extLst>
+          </p:nvPr>
+        </p:nvSpPr>
+        <p:spPr>
+          <a:xfrm>
+            <a:off x="0" y="0"/>
+            <a:ext cx="12192000" cy="3429000"/>
+          </a:xfrm>
+          <a:prstGeom prst="rect">
+            <a:avLst/>
+          </a:prstGeom>
+          <a:solidFill>
+            <a:schemeClr val="tx2"/>
+          </a:solidFill>
+          <a:ln>
+            <a:noFill/>
+          </a:ln>
+        </p:spPr>
+        <p:style>
+          <a:lnRef idx="2">
+            <a:schemeClr val="accent1">
+              <a:shade val="50000"/>
+            </a:schemeClr>
+          </a:lnRef>
+          <a:fillRef idx="1">
+            <a:schemeClr val="accent1"/>
+          </a:fillRef>
+          <a:effectRef idx="0">
+            <a:schemeClr val="accent1"/>
+          </a:effectRef>
+          <a:fontRef idx="minor">
+            <a:schemeClr val="lt1"/>
+          </a:fontRef>
+        </p:style>
+        <p:txBody>
+          <a:bodyPr rtlCol="0" anchor="ctr"/>
+          <a:lstStyle/>
+          <a:p>
+            <a:pPr algn="ctr"/>
+            <a:endParaRPr lang="en-US"/>
+          </a:p>
+        </p:txBody>
+      </p:sp>
+      <p:sp useBgFill="1">
+        <p:nvSpPr>
+          <p:cNvPr id="14" name="Rectangle 13">
+            <a:extLst>
+              <a:ext uri="{FF2B5EF4-FFF2-40B4-BE49-F238E27FC236}">
+                <a16:creationId xmlns:a16="http://schemas.microsoft.com/office/drawing/2014/main" id="{8A2FCF07-6918-45A6-B28F-1025FEBA7AEF}"/>
+              </a:ext>
+              <a:ext uri="{C183D7F6-B498-43B3-948B-1728B52AA6E4}">
+                <adec:decorative xmlns:adec="http://schemas.microsoft.com/office/drawing/2017/decorative" val="1"/>
+              </a:ext>
+            </a:extLst>
+          </p:cNvPr>
+          <p:cNvSpPr>
+            <a:spLocks noGrp="1" noRot="1" noChangeAspect="1" noMove="1" noResize="1" noEditPoints="1" noAdjustHandles="1" noChangeArrowheads="1" noChangeShapeType="1" noTextEdit="1"/>
+          </p:cNvSpPr>
+          <p:nvPr>
+            <p:extLst>
+              <p:ext uri="{386F3935-93C4-4BCD-93E2-E3B085C9AB24}">
+                <p16:designElem xmlns:p16="http://schemas.microsoft.com/office/powerpoint/2015/main" val="1"/>
+              </p:ext>
+            </p:extLst>
+          </p:nvPr>
+        </p:nvSpPr>
+        <p:spPr>
+          <a:xfrm>
+            <a:off x="0" y="0"/>
+            <a:ext cx="12192000" cy="6858000"/>
+          </a:xfrm>
+          <a:prstGeom prst="rect">
+            <a:avLst/>
+          </a:prstGeom>
+          <a:ln>
+            <a:noFill/>
+          </a:ln>
+        </p:spPr>
+        <p:style>
+          <a:lnRef idx="2">
+            <a:schemeClr val="accent1">
+              <a:shade val="50000"/>
+            </a:schemeClr>
+          </a:lnRef>
+          <a:fillRef idx="1">
+            <a:schemeClr val="accent1"/>
+          </a:fillRef>
+          <a:effectRef idx="0">
+            <a:schemeClr val="accent1"/>
+          </a:effectRef>
+          <a:fontRef idx="minor">
+            <a:schemeClr val="lt1"/>
+          </a:fontRef>
+        </p:style>
+        <p:txBody>
+          <a:bodyPr rtlCol="0" anchor="ctr"/>
+          <a:lstStyle/>
+          <a:p>
+            <a:pPr algn="ctr"/>
+            <a:endParaRPr lang="en-US"/>
+          </a:p>
+        </p:txBody>
+      </p:sp>
+      <p:sp>
+        <p:nvSpPr>
+          <p:cNvPr id="16" name="Rectangle 15">
+            <a:extLst>
+              <a:ext uri="{FF2B5EF4-FFF2-40B4-BE49-F238E27FC236}">
+                <a16:creationId xmlns:a16="http://schemas.microsoft.com/office/drawing/2014/main" id="{72EF3F9A-9717-4ACB-A30D-96694842C4F7}"/>
+              </a:ext>
+              <a:ext uri="{C183D7F6-B498-43B3-948B-1728B52AA6E4}">
+                <adec:decorative xmlns:adec="http://schemas.microsoft.com/office/drawing/2017/decorative" val="1"/>
+              </a:ext>
+            </a:extLst>
+          </p:cNvPr>
+          <p:cNvSpPr>
+            <a:spLocks noGrp="1" noRot="1" noChangeAspect="1" noMove="1" noResize="1" noEditPoints="1" noAdjustHandles="1" noChangeArrowheads="1" noChangeShapeType="1" noTextEdit="1"/>
+          </p:cNvSpPr>
+          <p:nvPr>
+            <p:extLst>
+              <p:ext uri="{386F3935-93C4-4BCD-93E2-E3B085C9AB24}">
+                <p16:designElem xmlns:p16="http://schemas.microsoft.com/office/powerpoint/2015/main" val="1"/>
+              </p:ext>
+            </p:extLst>
+          </p:nvPr>
+        </p:nvSpPr>
+        <p:spPr>
+          <a:xfrm>
+            <a:off x="0" y="1"/>
+            <a:ext cx="6083644" cy="3429000"/>
+          </a:xfrm>
+          <a:prstGeom prst="rect">
+            <a:avLst/>
+          </a:prstGeom>
+          <a:solidFill>
+            <a:schemeClr val="tx2"/>
+          </a:solidFill>
+          <a:ln>
+            <a:noFill/>
+          </a:ln>
+        </p:spPr>
+        <p:style>
+          <a:lnRef idx="2">
+            <a:schemeClr val="accent1">
+              <a:shade val="50000"/>
+            </a:schemeClr>
+          </a:lnRef>
+          <a:fillRef idx="1">
+            <a:schemeClr val="accent1"/>
+          </a:fillRef>
+          <a:effectRef idx="0">
+            <a:schemeClr val="accent1"/>
+          </a:effectRef>
+          <a:fontRef idx="minor">
+            <a:schemeClr val="lt1"/>
+          </a:fontRef>
+        </p:style>
+        <p:txBody>
+          <a:bodyPr rtlCol="0" anchor="ctr"/>
+          <a:lstStyle/>
+          <a:p>
+            <a:pPr algn="ctr"/>
+            <a:endParaRPr lang="en-US"/>
+          </a:p>
+        </p:txBody>
+      </p:sp>
+      <p:sp>
+        <p:nvSpPr>
+          <p:cNvPr id="2" name="Title 1">
+            <a:extLst>
+              <a:ext uri="{FF2B5EF4-FFF2-40B4-BE49-F238E27FC236}">
+                <a16:creationId xmlns:a16="http://schemas.microsoft.com/office/drawing/2014/main" id="{24EA14AD-C7D9-4A97-BA8F-A8F147F58940}"/>
+              </a:ext>
+            </a:extLst>
+          </p:cNvPr>
+          <p:cNvSpPr>
+            <a:spLocks noGrp="1"/>
+          </p:cNvSpPr>
+          <p:nvPr>
+            <p:ph type="title"/>
+          </p:nvPr>
+        </p:nvSpPr>
+        <p:spPr>
+          <a:xfrm>
+            <a:off x="484187" y="477982"/>
+            <a:ext cx="5184053" cy="2732809"/>
+          </a:xfrm>
+        </p:spPr>
+        <p:txBody>
+          <a:bodyPr vert="horz" lIns="91440" tIns="45720" rIns="91440" bIns="45720" rtlCol="0" anchor="ctr">
+            <a:normAutofit/>
+          </a:bodyPr>
+          <a:lstStyle/>
+          <a:p>
+            <a:r>
+              <a:rPr lang="en-US" dirty="0"/>
+              <a:t>Moran’s I</a:t>
+            </a:r>
+          </a:p>
+        </p:txBody>
+      </p:sp>
+      <p:grpSp>
+        <p:nvGrpSpPr>
+          <p:cNvPr id="18" name="Group 17">
+            <a:extLst>
+              <a:ext uri="{FF2B5EF4-FFF2-40B4-BE49-F238E27FC236}">
+                <a16:creationId xmlns:a16="http://schemas.microsoft.com/office/drawing/2014/main" id="{AFB7DB5B-426F-4EA9-BE51-7E14D257DE22}"/>
+              </a:ext>
+              <a:ext uri="{C183D7F6-B498-43B3-948B-1728B52AA6E4}">
+                <adec:decorative xmlns:adec="http://schemas.microsoft.com/office/drawing/2017/decorative" val="1"/>
+              </a:ext>
+            </a:extLst>
+          </p:cNvPr>
+          <p:cNvGrpSpPr>
+            <a:grpSpLocks noGrp="1" noUngrp="1" noRot="1" noChangeAspect="1" noMove="1" noResize="1"/>
+          </p:cNvGrpSpPr>
+          <p:nvPr>
+            <p:extLst>
+              <p:ext uri="{386F3935-93C4-4BCD-93E2-E3B085C9AB24}">
+                <p16:designElem xmlns:p16="http://schemas.microsoft.com/office/powerpoint/2015/main" val="1"/>
+              </p:ext>
+            </p:extLst>
+          </p:nvPr>
+        </p:nvGrpSpPr>
+        <p:grpSpPr>
+          <a:xfrm>
+            <a:off x="0" y="3428998"/>
+            <a:ext cx="6095998" cy="3429001"/>
+            <a:chOff x="6096002" y="-9073"/>
+            <a:chExt cx="6095998" cy="6867073"/>
+          </a:xfrm>
+        </p:grpSpPr>
+        <p:sp>
+          <p:nvSpPr>
+            <p:cNvPr id="19" name="Rectangle 18">
+              <a:extLst>
+                <a:ext uri="{FF2B5EF4-FFF2-40B4-BE49-F238E27FC236}">
+                  <a16:creationId xmlns:a16="http://schemas.microsoft.com/office/drawing/2014/main" id="{78EF7B3B-2DCA-4B00-898E-9C2C3AB1BC5E}"/>
+                </a:ext>
+                <a:ext uri="{C183D7F6-B498-43B3-948B-1728B52AA6E4}">
+                  <adec:decorative xmlns:adec="http://schemas.microsoft.com/office/drawing/2017/decorative" val="1"/>
+                </a:ext>
+              </a:extLst>
+            </p:cNvPr>
+            <p:cNvSpPr/>
+            <p:nvPr>
+              <p:extLst>
+                <p:ext uri="{386F3935-93C4-4BCD-93E2-E3B085C9AB24}">
+                  <p16:designElem xmlns:p16="http://schemas.microsoft.com/office/powerpoint/2015/main" val="1"/>
+                </p:ext>
+              </p:extLst>
+            </p:nvPr>
+          </p:nvSpPr>
+          <p:spPr>
+            <a:xfrm>
+              <a:off x="6096002" y="-9073"/>
+              <a:ext cx="6095998" cy="6867073"/>
+            </a:xfrm>
+            <a:prstGeom prst="rect">
+              <a:avLst/>
+            </a:prstGeom>
+            <a:solidFill>
+              <a:schemeClr val="bg2"/>
+            </a:solidFill>
+            <a:ln>
+              <a:noFill/>
+            </a:ln>
+          </p:spPr>
+          <p:style>
+            <a:lnRef idx="2">
+              <a:schemeClr val="accent1">
+                <a:shade val="50000"/>
+              </a:schemeClr>
+            </a:lnRef>
+            <a:fillRef idx="1">
+              <a:schemeClr val="accent1"/>
+            </a:fillRef>
+            <a:effectRef idx="0">
+              <a:schemeClr val="accent1"/>
+            </a:effectRef>
+            <a:fontRef idx="minor">
+              <a:schemeClr val="lt1"/>
+            </a:fontRef>
+          </p:style>
+          <p:txBody>
+            <a:bodyPr rtlCol="0" anchor="ctr"/>
+            <a:lstStyle>
+              <a:defPPr>
+                <a:defRPr lang="en-US"/>
+              </a:defPPr>
+              <a:lvl1pPr marL="0" algn="l" defTabSz="914400" rtl="0" eaLnBrk="1" latinLnBrk="0" hangingPunct="1">
+                <a:defRPr sz="1800" kern="1200">
+                  <a:solidFill>
+                    <a:schemeClr val="lt1"/>
+                  </a:solidFill>
+                  <a:latin typeface="+mn-lt"/>
+                  <a:ea typeface="+mn-ea"/>
+                  <a:cs typeface="+mn-cs"/>
+                </a:defRPr>
+              </a:lvl1pPr>
+              <a:lvl2pPr marL="457200" algn="l" defTabSz="914400" rtl="0" eaLnBrk="1" latinLnBrk="0" hangingPunct="1">
+                <a:defRPr sz="1800" kern="1200">
+                  <a:solidFill>
+                    <a:schemeClr val="lt1"/>
+                  </a:solidFill>
+                  <a:latin typeface="+mn-lt"/>
+                  <a:ea typeface="+mn-ea"/>
+                  <a:cs typeface="+mn-cs"/>
+                </a:defRPr>
+              </a:lvl2pPr>
+              <a:lvl3pPr marL="914400" algn="l" defTabSz="914400" rtl="0" eaLnBrk="1" latinLnBrk="0" hangingPunct="1">
+                <a:defRPr sz="1800" kern="1200">
+                  <a:solidFill>
+                    <a:schemeClr val="lt1"/>
+                  </a:solidFill>
+                  <a:latin typeface="+mn-lt"/>
+                  <a:ea typeface="+mn-ea"/>
+                  <a:cs typeface="+mn-cs"/>
+                </a:defRPr>
+              </a:lvl3pPr>
+              <a:lvl4pPr marL="1371600" algn="l" defTabSz="914400" rtl="0" eaLnBrk="1" latinLnBrk="0" hangingPunct="1">
+                <a:defRPr sz="1800" kern="1200">
+                  <a:solidFill>
+                    <a:schemeClr val="lt1"/>
+                  </a:solidFill>
+                  <a:latin typeface="+mn-lt"/>
+                  <a:ea typeface="+mn-ea"/>
+                  <a:cs typeface="+mn-cs"/>
+                </a:defRPr>
+              </a:lvl4pPr>
+              <a:lvl5pPr marL="1828800" algn="l" defTabSz="914400" rtl="0" eaLnBrk="1" latinLnBrk="0" hangingPunct="1">
+                <a:defRPr sz="1800" kern="1200">
+                  <a:solidFill>
+                    <a:schemeClr val="lt1"/>
+                  </a:solidFill>
+                  <a:latin typeface="+mn-lt"/>
+                  <a:ea typeface="+mn-ea"/>
+                  <a:cs typeface="+mn-cs"/>
+                </a:defRPr>
+              </a:lvl5pPr>
+              <a:lvl6pPr marL="2286000" algn="l" defTabSz="914400" rtl="0" eaLnBrk="1" latinLnBrk="0" hangingPunct="1">
+                <a:defRPr sz="1800" kern="1200">
+                  <a:solidFill>
+                    <a:schemeClr val="lt1"/>
+                  </a:solidFill>
+                  <a:latin typeface="+mn-lt"/>
+                  <a:ea typeface="+mn-ea"/>
+                  <a:cs typeface="+mn-cs"/>
+                </a:defRPr>
+              </a:lvl6pPr>
+              <a:lvl7pPr marL="2743200" algn="l" defTabSz="914400" rtl="0" eaLnBrk="1" latinLnBrk="0" hangingPunct="1">
+                <a:defRPr sz="1800" kern="1200">
+                  <a:solidFill>
+                    <a:schemeClr val="lt1"/>
+                  </a:solidFill>
+                  <a:latin typeface="+mn-lt"/>
+                  <a:ea typeface="+mn-ea"/>
+                  <a:cs typeface="+mn-cs"/>
+                </a:defRPr>
+              </a:lvl7pPr>
+              <a:lvl8pPr marL="3200400" algn="l" defTabSz="914400" rtl="0" eaLnBrk="1" latinLnBrk="0" hangingPunct="1">
+                <a:defRPr sz="1800" kern="1200">
+                  <a:solidFill>
+                    <a:schemeClr val="lt1"/>
+                  </a:solidFill>
+                  <a:latin typeface="+mn-lt"/>
+                  <a:ea typeface="+mn-ea"/>
+                  <a:cs typeface="+mn-cs"/>
+                </a:defRPr>
+              </a:lvl8pPr>
+              <a:lvl9pPr marL="3657600" algn="l" defTabSz="914400" rtl="0" eaLnBrk="1" latinLnBrk="0" hangingPunct="1">
+                <a:defRPr sz="1800" kern="1200">
+                  <a:solidFill>
+                    <a:schemeClr val="lt1"/>
+                  </a:solidFill>
+                  <a:latin typeface="+mn-lt"/>
+                  <a:ea typeface="+mn-ea"/>
+                  <a:cs typeface="+mn-cs"/>
+                </a:defRPr>
+              </a:lvl9pPr>
+            </a:lstStyle>
+            <a:p>
+              <a:pPr algn="ctr"/>
+              <a:endParaRPr lang="en-US"/>
+            </a:p>
+          </p:txBody>
+        </p:sp>
+        <p:sp>
+          <p:nvSpPr>
+            <p:cNvPr id="20" name="Rectangle 19">
+              <a:extLst>
+                <a:ext uri="{FF2B5EF4-FFF2-40B4-BE49-F238E27FC236}">
+                  <a16:creationId xmlns:a16="http://schemas.microsoft.com/office/drawing/2014/main" id="{7113B66E-A461-43A2-8FC0-85D09C2972DC}"/>
+                </a:ext>
+                <a:ext uri="{C183D7F6-B498-43B3-948B-1728B52AA6E4}">
+                  <adec:decorative xmlns:adec="http://schemas.microsoft.com/office/drawing/2017/decorative" val="1"/>
+                </a:ext>
+              </a:extLst>
+            </p:cNvPr>
+            <p:cNvSpPr/>
+            <p:nvPr>
+              <p:extLst>
+                <p:ext uri="{386F3935-93C4-4BCD-93E2-E3B085C9AB24}">
+                  <p16:designElem xmlns:p16="http://schemas.microsoft.com/office/powerpoint/2015/main" val="1"/>
+                </p:ext>
+              </p:extLst>
+            </p:nvPr>
+          </p:nvSpPr>
+          <p:spPr>
+            <a:xfrm>
+              <a:off x="6096002" y="-6987"/>
+              <a:ext cx="6095998" cy="6864987"/>
+            </a:xfrm>
+            <a:prstGeom prst="rect">
+              <a:avLst/>
+            </a:prstGeom>
+            <a:solidFill>
+              <a:srgbClr val="FFFFFF">
+                <a:alpha val="20000"/>
+              </a:srgbClr>
+            </a:solidFill>
+            <a:ln>
+              <a:noFill/>
+            </a:ln>
+          </p:spPr>
+          <p:style>
+            <a:lnRef idx="2">
+              <a:schemeClr val="accent1">
+                <a:shade val="50000"/>
+              </a:schemeClr>
+            </a:lnRef>
+            <a:fillRef idx="1">
+              <a:schemeClr val="accent1"/>
+            </a:fillRef>
+            <a:effectRef idx="0">
+              <a:schemeClr val="accent1"/>
+            </a:effectRef>
+            <a:fontRef idx="minor">
+              <a:schemeClr val="lt1"/>
+            </a:fontRef>
+          </p:style>
+          <p:txBody>
+            <a:bodyPr rtlCol="0" anchor="ctr"/>
+            <a:lstStyle>
+              <a:defPPr>
+                <a:defRPr lang="en-US"/>
+              </a:defPPr>
+              <a:lvl1pPr marL="0" algn="l" defTabSz="914400" rtl="0" eaLnBrk="1" latinLnBrk="0" hangingPunct="1">
+                <a:defRPr sz="1800" kern="1200">
+                  <a:solidFill>
+                    <a:schemeClr val="lt1"/>
+                  </a:solidFill>
+                  <a:latin typeface="+mn-lt"/>
+                  <a:ea typeface="+mn-ea"/>
+                  <a:cs typeface="+mn-cs"/>
+                </a:defRPr>
+              </a:lvl1pPr>
+              <a:lvl2pPr marL="457200" algn="l" defTabSz="914400" rtl="0" eaLnBrk="1" latinLnBrk="0" hangingPunct="1">
+                <a:defRPr sz="1800" kern="1200">
+                  <a:solidFill>
+                    <a:schemeClr val="lt1"/>
+                  </a:solidFill>
+                  <a:latin typeface="+mn-lt"/>
+                  <a:ea typeface="+mn-ea"/>
+                  <a:cs typeface="+mn-cs"/>
+                </a:defRPr>
+              </a:lvl2pPr>
+              <a:lvl3pPr marL="914400" algn="l" defTabSz="914400" rtl="0" eaLnBrk="1" latinLnBrk="0" hangingPunct="1">
+                <a:defRPr sz="1800" kern="1200">
+                  <a:solidFill>
+                    <a:schemeClr val="lt1"/>
+                  </a:solidFill>
+                  <a:latin typeface="+mn-lt"/>
+                  <a:ea typeface="+mn-ea"/>
+                  <a:cs typeface="+mn-cs"/>
+                </a:defRPr>
+              </a:lvl3pPr>
+              <a:lvl4pPr marL="1371600" algn="l" defTabSz="914400" rtl="0" eaLnBrk="1" latinLnBrk="0" hangingPunct="1">
+                <a:defRPr sz="1800" kern="1200">
+                  <a:solidFill>
+                    <a:schemeClr val="lt1"/>
+                  </a:solidFill>
+                  <a:latin typeface="+mn-lt"/>
+                  <a:ea typeface="+mn-ea"/>
+                  <a:cs typeface="+mn-cs"/>
+                </a:defRPr>
+              </a:lvl4pPr>
+              <a:lvl5pPr marL="1828800" algn="l" defTabSz="914400" rtl="0" eaLnBrk="1" latinLnBrk="0" hangingPunct="1">
+                <a:defRPr sz="1800" kern="1200">
+                  <a:solidFill>
+                    <a:schemeClr val="lt1"/>
+                  </a:solidFill>
+                  <a:latin typeface="+mn-lt"/>
+                  <a:ea typeface="+mn-ea"/>
+                  <a:cs typeface="+mn-cs"/>
+                </a:defRPr>
+              </a:lvl5pPr>
+              <a:lvl6pPr marL="2286000" algn="l" defTabSz="914400" rtl="0" eaLnBrk="1" latinLnBrk="0" hangingPunct="1">
+                <a:defRPr sz="1800" kern="1200">
+                  <a:solidFill>
+                    <a:schemeClr val="lt1"/>
+                  </a:solidFill>
+                  <a:latin typeface="+mn-lt"/>
+                  <a:ea typeface="+mn-ea"/>
+                  <a:cs typeface="+mn-cs"/>
+                </a:defRPr>
+              </a:lvl6pPr>
+              <a:lvl7pPr marL="2743200" algn="l" defTabSz="914400" rtl="0" eaLnBrk="1" latinLnBrk="0" hangingPunct="1">
+                <a:defRPr sz="1800" kern="1200">
+                  <a:solidFill>
+                    <a:schemeClr val="lt1"/>
+                  </a:solidFill>
+                  <a:latin typeface="+mn-lt"/>
+                  <a:ea typeface="+mn-ea"/>
+                  <a:cs typeface="+mn-cs"/>
+                </a:defRPr>
+              </a:lvl7pPr>
+              <a:lvl8pPr marL="3200400" algn="l" defTabSz="914400" rtl="0" eaLnBrk="1" latinLnBrk="0" hangingPunct="1">
+                <a:defRPr sz="1800" kern="1200">
+                  <a:solidFill>
+                    <a:schemeClr val="lt1"/>
+                  </a:solidFill>
+                  <a:latin typeface="+mn-lt"/>
+                  <a:ea typeface="+mn-ea"/>
+                  <a:cs typeface="+mn-cs"/>
+                </a:defRPr>
+              </a:lvl8pPr>
+              <a:lvl9pPr marL="3657600" algn="l" defTabSz="914400" rtl="0" eaLnBrk="1" latinLnBrk="0" hangingPunct="1">
+                <a:defRPr sz="1800" kern="1200">
+                  <a:solidFill>
+                    <a:schemeClr val="lt1"/>
+                  </a:solidFill>
+                  <a:latin typeface="+mn-lt"/>
+                  <a:ea typeface="+mn-ea"/>
+                  <a:cs typeface="+mn-cs"/>
+                </a:defRPr>
+              </a:lvl9pPr>
+            </a:lstStyle>
+            <a:p>
+              <a:pPr algn="ctr"/>
+              <a:endParaRPr lang="en-US" dirty="0"/>
+            </a:p>
+          </p:txBody>
+        </p:sp>
+      </p:grpSp>
+      <p:sp>
+        <p:nvSpPr>
+          <p:cNvPr id="3" name="Content Placeholder 2">
+            <a:extLst>
+              <a:ext uri="{FF2B5EF4-FFF2-40B4-BE49-F238E27FC236}">
+                <a16:creationId xmlns:a16="http://schemas.microsoft.com/office/drawing/2014/main" id="{BE95302E-27F8-4506-AA30-DBC75E3AD29A}"/>
+              </a:ext>
+            </a:extLst>
+          </p:cNvPr>
+          <p:cNvSpPr>
+            <a:spLocks noGrp="1"/>
+          </p:cNvSpPr>
+          <p:nvPr>
+            <p:ph idx="1"/>
+          </p:nvPr>
+        </p:nvSpPr>
+        <p:spPr>
+          <a:xfrm>
+            <a:off x="484187" y="3818659"/>
+            <a:ext cx="5147685" cy="2404341"/>
+          </a:xfrm>
+        </p:spPr>
+        <p:txBody>
+          <a:bodyPr vert="horz" lIns="91440" tIns="45720" rIns="91440" bIns="45720" rtlCol="0" anchor="ctr">
+            <a:normAutofit/>
+          </a:bodyPr>
+          <a:lstStyle/>
+          <a:p>
+            <a:r>
+              <a:rPr lang="en-US" sz="2400" dirty="0"/>
+              <a:t>Are Asian Americans Clustered?</a:t>
+            </a:r>
+          </a:p>
+        </p:txBody>
+      </p:sp>
+      <p:pic>
+        <p:nvPicPr>
+          <p:cNvPr id="7" name="Picture 6" descr="Map&#10;&#10;Description automatically generated">
+            <a:extLst>
+              <a:ext uri="{FF2B5EF4-FFF2-40B4-BE49-F238E27FC236}">
+                <a16:creationId xmlns:a16="http://schemas.microsoft.com/office/drawing/2014/main" id="{0F3684CD-1108-41B5-B46F-C8B1868980E5}"/>
+              </a:ext>
+            </a:extLst>
+          </p:cNvPr>
+          <p:cNvPicPr>
+            <a:picLocks noChangeAspect="1"/>
+          </p:cNvPicPr>
+          <p:nvPr/>
+        </p:nvPicPr>
+        <p:blipFill>
+          <a:blip r:embed="rId2">
+            <a:extLst>
+              <a:ext uri="{28A0092B-C50C-407E-A947-70E740481C1C}">
+                <a14:useLocalDpi xmlns:a14="http://schemas.microsoft.com/office/drawing/2010/main" val="0"/>
+              </a:ext>
+            </a:extLst>
+          </a:blip>
+          <a:stretch>
+            <a:fillRect/>
+          </a:stretch>
+        </p:blipFill>
+        <p:spPr>
+          <a:xfrm>
+            <a:off x="6803136" y="171991"/>
+            <a:ext cx="4345801" cy="3085017"/>
+          </a:xfrm>
+          <a:prstGeom prst="rect">
+            <a:avLst/>
+          </a:prstGeom>
+        </p:spPr>
+      </p:pic>
+      <p:pic>
+        <p:nvPicPr>
+          <p:cNvPr id="5" name="Picture 4" descr="Map&#10;&#10;Description automatically generated">
+            <a:extLst>
+              <a:ext uri="{FF2B5EF4-FFF2-40B4-BE49-F238E27FC236}">
+                <a16:creationId xmlns:a16="http://schemas.microsoft.com/office/drawing/2014/main" id="{05C3A40E-D50A-4A77-9C44-E33C76659B6A}"/>
+              </a:ext>
+            </a:extLst>
+          </p:cNvPr>
+          <p:cNvPicPr>
+            <a:picLocks noChangeAspect="1"/>
+          </p:cNvPicPr>
+          <p:nvPr/>
+        </p:nvPicPr>
+        <p:blipFill>
+          <a:blip r:embed="rId3">
+            <a:extLst>
+              <a:ext uri="{28A0092B-C50C-407E-A947-70E740481C1C}">
+                <a14:useLocalDpi xmlns:a14="http://schemas.microsoft.com/office/drawing/2010/main" val="0"/>
+              </a:ext>
+            </a:extLst>
+          </a:blip>
+          <a:stretch>
+            <a:fillRect/>
+          </a:stretch>
+        </p:blipFill>
+        <p:spPr>
+          <a:xfrm>
+            <a:off x="7287768" y="3428998"/>
+            <a:ext cx="4487307" cy="3185470"/>
+          </a:xfrm>
+          <a:prstGeom prst="rect">
+            <a:avLst/>
+          </a:prstGeom>
+        </p:spPr>
+      </p:pic>
+    </p:spTree>
+    <p:extLst>
+      <p:ext uri="{BB962C8B-B14F-4D97-AF65-F5344CB8AC3E}">
+        <p14:creationId xmlns:p14="http://schemas.microsoft.com/office/powerpoint/2010/main" val="3869791731"/>
+      </p:ext>
+    </p:extLst>
+  </p:cSld>
+  <p:clrMapOvr>
+    <a:masterClrMapping/>
+  </p:clrMapOvr>
+</p:sld>
+</file>
+
+<file path=ppt/slides/slide9.xml><?xml version="1.0" encoding="utf-8"?>
+<p:sld xmlns:a="http://schemas.openxmlformats.org/drawingml/2006/main" xmlns:r="http://schemas.openxmlformats.org/officeDocument/2006/relationships" xmlns:p="http://schemas.openxmlformats.org/presentationml/2006/main">
+  <p:cSld>
+    <p:bg>
+      <p:bgPr>
+        <a:solidFill>
+          <a:schemeClr val="bg1"/>
+        </a:solidFill>
+        <a:effectLst/>
+      </p:bgPr>
+    </p:bg>
+    <p:spTree>
+      <p:nvGrpSpPr>
+        <p:cNvPr id="1" name=""/>
+        <p:cNvGrpSpPr/>
+        <p:nvPr/>
+      </p:nvGrpSpPr>
+      <p:grpSpPr>
+        <a:xfrm>
+          <a:off x="0" y="0"/>
+          <a:ext cx="0" cy="0"/>
+          <a:chOff x="0" y="0"/>
+          <a:chExt cx="0" cy="0"/>
+        </a:xfrm>
+      </p:grpSpPr>
+      <p:sp>
+        <p:nvSpPr>
+          <p:cNvPr id="12" name="Rectangle 11">
+            <a:extLst>
+              <a:ext uri="{FF2B5EF4-FFF2-40B4-BE49-F238E27FC236}">
+                <a16:creationId xmlns:a16="http://schemas.microsoft.com/office/drawing/2014/main" id="{50666DC1-CD27-4874-9484-9D06C59FE4D0}"/>
+              </a:ext>
+              <a:ext uri="{C183D7F6-B498-43B3-948B-1728B52AA6E4}">
+                <adec:decorative xmlns:adec="http://schemas.microsoft.com/office/drawing/2017/decorative" val="1"/>
+              </a:ext>
+            </a:extLst>
+          </p:cNvPr>
+          <p:cNvSpPr>
+            <a:spLocks noGrp="1" noRot="1" noChangeAspect="1" noMove="1" noResize="1" noEditPoints="1" noAdjustHandles="1" noChangeArrowheads="1" noChangeShapeType="1" noTextEdit="1"/>
+          </p:cNvSpPr>
+          <p:nvPr>
+            <p:extLst>
+              <p:ext uri="{386F3935-93C4-4BCD-93E2-E3B085C9AB24}">
+                <p16:designElem xmlns:p16="http://schemas.microsoft.com/office/powerpoint/2015/main" val="1"/>
+              </p:ext>
+            </p:extLst>
+          </p:nvPr>
+        </p:nvSpPr>
+        <p:spPr>
+          <a:xfrm>
+            <a:off x="0" y="0"/>
+            <a:ext cx="12192000" cy="3429000"/>
+          </a:xfrm>
+          <a:prstGeom prst="rect">
+            <a:avLst/>
+          </a:prstGeom>
+          <a:solidFill>
+            <a:schemeClr val="tx2"/>
+          </a:solidFill>
+          <a:ln>
+            <a:noFill/>
+          </a:ln>
+        </p:spPr>
+        <p:style>
+          <a:lnRef idx="2">
+            <a:schemeClr val="accent1">
+              <a:shade val="50000"/>
+            </a:schemeClr>
+          </a:lnRef>
+          <a:fillRef idx="1">
+            <a:schemeClr val="accent1"/>
+          </a:fillRef>
+          <a:effectRef idx="0">
+            <a:schemeClr val="accent1"/>
+          </a:effectRef>
+          <a:fontRef idx="minor">
+            <a:schemeClr val="lt1"/>
+          </a:fontRef>
+        </p:style>
+        <p:txBody>
+          <a:bodyPr rtlCol="0" anchor="ctr"/>
+          <a:lstStyle/>
+          <a:p>
+            <a:pPr algn="ctr"/>
+            <a:endParaRPr lang="en-US"/>
+          </a:p>
+        </p:txBody>
+      </p:sp>
+      <p:sp useBgFill="1">
+        <p:nvSpPr>
+          <p:cNvPr id="14" name="Rectangle 13">
+            <a:extLst>
+              <a:ext uri="{FF2B5EF4-FFF2-40B4-BE49-F238E27FC236}">
+                <a16:creationId xmlns:a16="http://schemas.microsoft.com/office/drawing/2014/main" id="{8A2FCF07-6918-45A6-B28F-1025FEBA7AEF}"/>
+              </a:ext>
+              <a:ext uri="{C183D7F6-B498-43B3-948B-1728B52AA6E4}">
+                <adec:decorative xmlns:adec="http://schemas.microsoft.com/office/drawing/2017/decorative" val="1"/>
+              </a:ext>
+            </a:extLst>
+          </p:cNvPr>
+          <p:cNvSpPr>
+            <a:spLocks noGrp="1" noRot="1" noChangeAspect="1" noMove="1" noResize="1" noEditPoints="1" noAdjustHandles="1" noChangeArrowheads="1" noChangeShapeType="1" noTextEdit="1"/>
+          </p:cNvSpPr>
+          <p:nvPr>
+            <p:extLst>
+              <p:ext uri="{386F3935-93C4-4BCD-93E2-E3B085C9AB24}">
+                <p16:designElem xmlns:p16="http://schemas.microsoft.com/office/powerpoint/2015/main" val="1"/>
+              </p:ext>
+            </p:extLst>
+          </p:nvPr>
+        </p:nvSpPr>
+        <p:spPr>
+          <a:xfrm>
+            <a:off x="0" y="0"/>
+            <a:ext cx="12192000" cy="6858000"/>
+          </a:xfrm>
+          <a:prstGeom prst="rect">
+            <a:avLst/>
+          </a:prstGeom>
+          <a:ln>
+            <a:noFill/>
+          </a:ln>
+        </p:spPr>
+        <p:style>
+          <a:lnRef idx="2">
+            <a:schemeClr val="accent1">
+              <a:shade val="50000"/>
+            </a:schemeClr>
+          </a:lnRef>
+          <a:fillRef idx="1">
+            <a:schemeClr val="accent1"/>
+          </a:fillRef>
+          <a:effectRef idx="0">
+            <a:schemeClr val="accent1"/>
+          </a:effectRef>
+          <a:fontRef idx="minor">
+            <a:schemeClr val="lt1"/>
+          </a:fontRef>
+        </p:style>
+        <p:txBody>
+          <a:bodyPr rtlCol="0" anchor="ctr"/>
+          <a:lstStyle/>
+          <a:p>
+            <a:pPr algn="ctr"/>
+            <a:endParaRPr lang="en-US"/>
+          </a:p>
+        </p:txBody>
+      </p:sp>
+      <p:sp>
+        <p:nvSpPr>
+          <p:cNvPr id="16" name="Rectangle 15">
+            <a:extLst>
+              <a:ext uri="{FF2B5EF4-FFF2-40B4-BE49-F238E27FC236}">
+                <a16:creationId xmlns:a16="http://schemas.microsoft.com/office/drawing/2014/main" id="{72EF3F9A-9717-4ACB-A30D-96694842C4F7}"/>
+              </a:ext>
+              <a:ext uri="{C183D7F6-B498-43B3-948B-1728B52AA6E4}">
+                <adec:decorative xmlns:adec="http://schemas.microsoft.com/office/drawing/2017/decorative" val="1"/>
+              </a:ext>
+            </a:extLst>
+          </p:cNvPr>
+          <p:cNvSpPr>
+            <a:spLocks noGrp="1" noRot="1" noChangeAspect="1" noMove="1" noResize="1" noEditPoints="1" noAdjustHandles="1" noChangeArrowheads="1" noChangeShapeType="1" noTextEdit="1"/>
+          </p:cNvSpPr>
+          <p:nvPr>
+            <p:extLst>
+              <p:ext uri="{386F3935-93C4-4BCD-93E2-E3B085C9AB24}">
+                <p16:designElem xmlns:p16="http://schemas.microsoft.com/office/powerpoint/2015/main" val="1"/>
+              </p:ext>
+            </p:extLst>
+          </p:nvPr>
+        </p:nvSpPr>
+        <p:spPr>
+          <a:xfrm>
+            <a:off x="0" y="1"/>
+            <a:ext cx="6083644" cy="3429000"/>
+          </a:xfrm>
+          <a:prstGeom prst="rect">
+            <a:avLst/>
+          </a:prstGeom>
+          <a:solidFill>
+            <a:schemeClr val="tx2"/>
+          </a:solidFill>
+          <a:ln>
+            <a:noFill/>
+          </a:ln>
+        </p:spPr>
+        <p:style>
+          <a:lnRef idx="2">
+            <a:schemeClr val="accent1">
+              <a:shade val="50000"/>
+            </a:schemeClr>
+          </a:lnRef>
+          <a:fillRef idx="1">
+            <a:schemeClr val="accent1"/>
+          </a:fillRef>
+          <a:effectRef idx="0">
+            <a:schemeClr val="accent1"/>
+          </a:effectRef>
+          <a:fontRef idx="minor">
+            <a:schemeClr val="lt1"/>
+          </a:fontRef>
+        </p:style>
+        <p:txBody>
+          <a:bodyPr rtlCol="0" anchor="ctr"/>
+          <a:lstStyle/>
+          <a:p>
+            <a:pPr algn="ctr"/>
+            <a:endParaRPr lang="en-US"/>
+          </a:p>
+        </p:txBody>
+      </p:sp>
+      <p:sp>
+        <p:nvSpPr>
+          <p:cNvPr id="2" name="Title 1">
+            <a:extLst>
+              <a:ext uri="{FF2B5EF4-FFF2-40B4-BE49-F238E27FC236}">
+                <a16:creationId xmlns:a16="http://schemas.microsoft.com/office/drawing/2014/main" id="{85B4ECD2-F691-4FF0-A59B-C5BE35CDD714}"/>
+              </a:ext>
+            </a:extLst>
+          </p:cNvPr>
+          <p:cNvSpPr>
+            <a:spLocks noGrp="1"/>
+          </p:cNvSpPr>
+          <p:nvPr>
+            <p:ph type="title"/>
+          </p:nvPr>
+        </p:nvSpPr>
+        <p:spPr>
+          <a:xfrm>
+            <a:off x="484187" y="477982"/>
+            <a:ext cx="5184053" cy="2732809"/>
+          </a:xfrm>
+        </p:spPr>
+        <p:txBody>
+          <a:bodyPr vert="horz" lIns="91440" tIns="45720" rIns="91440" bIns="45720" rtlCol="0" anchor="ctr">
+            <a:normAutofit/>
+          </a:bodyPr>
+          <a:lstStyle/>
+          <a:p>
+            <a:r>
+              <a:rPr lang="en-US" dirty="0"/>
+              <a:t>Moran’s I</a:t>
+            </a:r>
+          </a:p>
+        </p:txBody>
+      </p:sp>
+      <p:grpSp>
+        <p:nvGrpSpPr>
+          <p:cNvPr id="18" name="Group 17">
+            <a:extLst>
+              <a:ext uri="{FF2B5EF4-FFF2-40B4-BE49-F238E27FC236}">
+                <a16:creationId xmlns:a16="http://schemas.microsoft.com/office/drawing/2014/main" id="{AFB7DB5B-426F-4EA9-BE51-7E14D257DE22}"/>
+              </a:ext>
+              <a:ext uri="{C183D7F6-B498-43B3-948B-1728B52AA6E4}">
+                <adec:decorative xmlns:adec="http://schemas.microsoft.com/office/drawing/2017/decorative" val="1"/>
+              </a:ext>
+            </a:extLst>
+          </p:cNvPr>
+          <p:cNvGrpSpPr>
+            <a:grpSpLocks noGrp="1" noUngrp="1" noRot="1" noChangeAspect="1" noMove="1" noResize="1"/>
+          </p:cNvGrpSpPr>
+          <p:nvPr>
+            <p:extLst>
+              <p:ext uri="{386F3935-93C4-4BCD-93E2-E3B085C9AB24}">
+                <p16:designElem xmlns:p16="http://schemas.microsoft.com/office/powerpoint/2015/main" val="1"/>
+              </p:ext>
+            </p:extLst>
+          </p:nvPr>
+        </p:nvGrpSpPr>
+        <p:grpSpPr>
+          <a:xfrm>
+            <a:off x="0" y="3428998"/>
+            <a:ext cx="6095998" cy="3429001"/>
+            <a:chOff x="6096002" y="-9073"/>
+            <a:chExt cx="6095998" cy="6867073"/>
+          </a:xfrm>
+        </p:grpSpPr>
+        <p:sp>
+          <p:nvSpPr>
+            <p:cNvPr id="19" name="Rectangle 18">
+              <a:extLst>
+                <a:ext uri="{FF2B5EF4-FFF2-40B4-BE49-F238E27FC236}">
+                  <a16:creationId xmlns:a16="http://schemas.microsoft.com/office/drawing/2014/main" id="{78EF7B3B-2DCA-4B00-898E-9C2C3AB1BC5E}"/>
+                </a:ext>
+                <a:ext uri="{C183D7F6-B498-43B3-948B-1728B52AA6E4}">
+                  <adec:decorative xmlns:adec="http://schemas.microsoft.com/office/drawing/2017/decorative" val="1"/>
+                </a:ext>
+              </a:extLst>
+            </p:cNvPr>
+            <p:cNvSpPr/>
+            <p:nvPr>
+              <p:extLst>
+                <p:ext uri="{386F3935-93C4-4BCD-93E2-E3B085C9AB24}">
+                  <p16:designElem xmlns:p16="http://schemas.microsoft.com/office/powerpoint/2015/main" val="1"/>
+                </p:ext>
+              </p:extLst>
+            </p:nvPr>
+          </p:nvSpPr>
+          <p:spPr>
+            <a:xfrm>
+              <a:off x="6096002" y="-9073"/>
+              <a:ext cx="6095998" cy="6867073"/>
+            </a:xfrm>
+            <a:prstGeom prst="rect">
+              <a:avLst/>
+            </a:prstGeom>
+            <a:solidFill>
+              <a:schemeClr val="bg2"/>
+            </a:solidFill>
+            <a:ln>
+              <a:noFill/>
+            </a:ln>
+          </p:spPr>
+          <p:style>
+            <a:lnRef idx="2">
+              <a:schemeClr val="accent1">
+                <a:shade val="50000"/>
+              </a:schemeClr>
+            </a:lnRef>
+            <a:fillRef idx="1">
+              <a:schemeClr val="accent1"/>
+            </a:fillRef>
+            <a:effectRef idx="0">
+              <a:schemeClr val="accent1"/>
+            </a:effectRef>
+            <a:fontRef idx="minor">
+              <a:schemeClr val="lt1"/>
+            </a:fontRef>
+          </p:style>
+          <p:txBody>
+            <a:bodyPr rtlCol="0" anchor="ctr"/>
+            <a:lstStyle>
+              <a:defPPr>
+                <a:defRPr lang="en-US"/>
+              </a:defPPr>
+              <a:lvl1pPr marL="0" algn="l" defTabSz="914400" rtl="0" eaLnBrk="1" latinLnBrk="0" hangingPunct="1">
+                <a:defRPr sz="1800" kern="1200">
+                  <a:solidFill>
+                    <a:schemeClr val="lt1"/>
+                  </a:solidFill>
+                  <a:latin typeface="+mn-lt"/>
+                  <a:ea typeface="+mn-ea"/>
+                  <a:cs typeface="+mn-cs"/>
+                </a:defRPr>
+              </a:lvl1pPr>
+              <a:lvl2pPr marL="457200" algn="l" defTabSz="914400" rtl="0" eaLnBrk="1" latinLnBrk="0" hangingPunct="1">
+                <a:defRPr sz="1800" kern="1200">
+                  <a:solidFill>
+                    <a:schemeClr val="lt1"/>
+                  </a:solidFill>
+                  <a:latin typeface="+mn-lt"/>
+                  <a:ea typeface="+mn-ea"/>
+                  <a:cs typeface="+mn-cs"/>
+                </a:defRPr>
+              </a:lvl2pPr>
+              <a:lvl3pPr marL="914400" algn="l" defTabSz="914400" rtl="0" eaLnBrk="1" latinLnBrk="0" hangingPunct="1">
+                <a:defRPr sz="1800" kern="1200">
+                  <a:solidFill>
+                    <a:schemeClr val="lt1"/>
+                  </a:solidFill>
+                  <a:latin typeface="+mn-lt"/>
+                  <a:ea typeface="+mn-ea"/>
+                  <a:cs typeface="+mn-cs"/>
+                </a:defRPr>
+              </a:lvl3pPr>
+              <a:lvl4pPr marL="1371600" algn="l" defTabSz="914400" rtl="0" eaLnBrk="1" latinLnBrk="0" hangingPunct="1">
+                <a:defRPr sz="1800" kern="1200">
+                  <a:solidFill>
+                    <a:schemeClr val="lt1"/>
+                  </a:solidFill>
+                  <a:latin typeface="+mn-lt"/>
+                  <a:ea typeface="+mn-ea"/>
+                  <a:cs typeface="+mn-cs"/>
+                </a:defRPr>
+              </a:lvl4pPr>
+              <a:lvl5pPr marL="1828800" algn="l" defTabSz="914400" rtl="0" eaLnBrk="1" latinLnBrk="0" hangingPunct="1">
+                <a:defRPr sz="1800" kern="1200">
+                  <a:solidFill>
+                    <a:schemeClr val="lt1"/>
+                  </a:solidFill>
+                  <a:latin typeface="+mn-lt"/>
+                  <a:ea typeface="+mn-ea"/>
+                  <a:cs typeface="+mn-cs"/>
+                </a:defRPr>
+              </a:lvl5pPr>
+              <a:lvl6pPr marL="2286000" algn="l" defTabSz="914400" rtl="0" eaLnBrk="1" latinLnBrk="0" hangingPunct="1">
+                <a:defRPr sz="1800" kern="1200">
+                  <a:solidFill>
+                    <a:schemeClr val="lt1"/>
+                  </a:solidFill>
+                  <a:latin typeface="+mn-lt"/>
+                  <a:ea typeface="+mn-ea"/>
+                  <a:cs typeface="+mn-cs"/>
+                </a:defRPr>
+              </a:lvl6pPr>
+              <a:lvl7pPr marL="2743200" algn="l" defTabSz="914400" rtl="0" eaLnBrk="1" latinLnBrk="0" hangingPunct="1">
+                <a:defRPr sz="1800" kern="1200">
+                  <a:solidFill>
+                    <a:schemeClr val="lt1"/>
+                  </a:solidFill>
+                  <a:latin typeface="+mn-lt"/>
+                  <a:ea typeface="+mn-ea"/>
+                  <a:cs typeface="+mn-cs"/>
+                </a:defRPr>
+              </a:lvl7pPr>
+              <a:lvl8pPr marL="3200400" algn="l" defTabSz="914400" rtl="0" eaLnBrk="1" latinLnBrk="0" hangingPunct="1">
+                <a:defRPr sz="1800" kern="1200">
+                  <a:solidFill>
+                    <a:schemeClr val="lt1"/>
+                  </a:solidFill>
+                  <a:latin typeface="+mn-lt"/>
+                  <a:ea typeface="+mn-ea"/>
+                  <a:cs typeface="+mn-cs"/>
+                </a:defRPr>
+              </a:lvl8pPr>
+              <a:lvl9pPr marL="3657600" algn="l" defTabSz="914400" rtl="0" eaLnBrk="1" latinLnBrk="0" hangingPunct="1">
+                <a:defRPr sz="1800" kern="1200">
+                  <a:solidFill>
+                    <a:schemeClr val="lt1"/>
+                  </a:solidFill>
+                  <a:latin typeface="+mn-lt"/>
+                  <a:ea typeface="+mn-ea"/>
+                  <a:cs typeface="+mn-cs"/>
+                </a:defRPr>
+              </a:lvl9pPr>
+            </a:lstStyle>
+            <a:p>
+              <a:pPr algn="ctr"/>
+              <a:endParaRPr lang="en-US"/>
+            </a:p>
+          </p:txBody>
+        </p:sp>
+        <p:sp>
+          <p:nvSpPr>
+            <p:cNvPr id="20" name="Rectangle 19">
+              <a:extLst>
+                <a:ext uri="{FF2B5EF4-FFF2-40B4-BE49-F238E27FC236}">
+                  <a16:creationId xmlns:a16="http://schemas.microsoft.com/office/drawing/2014/main" id="{7113B66E-A461-43A2-8FC0-85D09C2972DC}"/>
+                </a:ext>
+                <a:ext uri="{C183D7F6-B498-43B3-948B-1728B52AA6E4}">
+                  <adec:decorative xmlns:adec="http://schemas.microsoft.com/office/drawing/2017/decorative" val="1"/>
+                </a:ext>
+              </a:extLst>
+            </p:cNvPr>
+            <p:cNvSpPr/>
+            <p:nvPr>
+              <p:extLst>
+                <p:ext uri="{386F3935-93C4-4BCD-93E2-E3B085C9AB24}">
+                  <p16:designElem xmlns:p16="http://schemas.microsoft.com/office/powerpoint/2015/main" val="1"/>
+                </p:ext>
+              </p:extLst>
+            </p:nvPr>
+          </p:nvSpPr>
+          <p:spPr>
+            <a:xfrm>
+              <a:off x="6096002" y="-6987"/>
+              <a:ext cx="6095998" cy="6864987"/>
+            </a:xfrm>
+            <a:prstGeom prst="rect">
+              <a:avLst/>
+            </a:prstGeom>
+            <a:solidFill>
+              <a:srgbClr val="FFFFFF">
+                <a:alpha val="20000"/>
+              </a:srgbClr>
+            </a:solidFill>
+            <a:ln>
+              <a:noFill/>
+            </a:ln>
+          </p:spPr>
+          <p:style>
+            <a:lnRef idx="2">
+              <a:schemeClr val="accent1">
+                <a:shade val="50000"/>
+              </a:schemeClr>
+            </a:lnRef>
+            <a:fillRef idx="1">
+              <a:schemeClr val="accent1"/>
+            </a:fillRef>
+            <a:effectRef idx="0">
+              <a:schemeClr val="accent1"/>
+            </a:effectRef>
+            <a:fontRef idx="minor">
+              <a:schemeClr val="lt1"/>
+            </a:fontRef>
+          </p:style>
+          <p:txBody>
+            <a:bodyPr rtlCol="0" anchor="ctr"/>
+            <a:lstStyle>
+              <a:defPPr>
+                <a:defRPr lang="en-US"/>
+              </a:defPPr>
+              <a:lvl1pPr marL="0" algn="l" defTabSz="914400" rtl="0" eaLnBrk="1" latinLnBrk="0" hangingPunct="1">
+                <a:defRPr sz="1800" kern="1200">
+                  <a:solidFill>
+                    <a:schemeClr val="lt1"/>
+                  </a:solidFill>
+                  <a:latin typeface="+mn-lt"/>
+                  <a:ea typeface="+mn-ea"/>
+                  <a:cs typeface="+mn-cs"/>
+                </a:defRPr>
+              </a:lvl1pPr>
+              <a:lvl2pPr marL="457200" algn="l" defTabSz="914400" rtl="0" eaLnBrk="1" latinLnBrk="0" hangingPunct="1">
+                <a:defRPr sz="1800" kern="1200">
+                  <a:solidFill>
+                    <a:schemeClr val="lt1"/>
+                  </a:solidFill>
+                  <a:latin typeface="+mn-lt"/>
+                  <a:ea typeface="+mn-ea"/>
+                  <a:cs typeface="+mn-cs"/>
+                </a:defRPr>
+              </a:lvl2pPr>
+              <a:lvl3pPr marL="914400" algn="l" defTabSz="914400" rtl="0" eaLnBrk="1" latinLnBrk="0" hangingPunct="1">
+                <a:defRPr sz="1800" kern="1200">
+                  <a:solidFill>
+                    <a:schemeClr val="lt1"/>
+                  </a:solidFill>
+                  <a:latin typeface="+mn-lt"/>
+                  <a:ea typeface="+mn-ea"/>
+                  <a:cs typeface="+mn-cs"/>
+                </a:defRPr>
+              </a:lvl3pPr>
+              <a:lvl4pPr marL="1371600" algn="l" defTabSz="914400" rtl="0" eaLnBrk="1" latinLnBrk="0" hangingPunct="1">
+                <a:defRPr sz="1800" kern="1200">
+                  <a:solidFill>
+                    <a:schemeClr val="lt1"/>
+                  </a:solidFill>
+                  <a:latin typeface="+mn-lt"/>
+                  <a:ea typeface="+mn-ea"/>
+                  <a:cs typeface="+mn-cs"/>
+                </a:defRPr>
+              </a:lvl4pPr>
+              <a:lvl5pPr marL="1828800" algn="l" defTabSz="914400" rtl="0" eaLnBrk="1" latinLnBrk="0" hangingPunct="1">
+                <a:defRPr sz="1800" kern="1200">
+                  <a:solidFill>
+                    <a:schemeClr val="lt1"/>
+                  </a:solidFill>
+                  <a:latin typeface="+mn-lt"/>
+                  <a:ea typeface="+mn-ea"/>
+                  <a:cs typeface="+mn-cs"/>
+                </a:defRPr>
+              </a:lvl5pPr>
+              <a:lvl6pPr marL="2286000" algn="l" defTabSz="914400" rtl="0" eaLnBrk="1" latinLnBrk="0" hangingPunct="1">
+                <a:defRPr sz="1800" kern="1200">
+                  <a:solidFill>
+                    <a:schemeClr val="lt1"/>
+                  </a:solidFill>
+                  <a:latin typeface="+mn-lt"/>
+                  <a:ea typeface="+mn-ea"/>
+                  <a:cs typeface="+mn-cs"/>
+                </a:defRPr>
+              </a:lvl6pPr>
+              <a:lvl7pPr marL="2743200" algn="l" defTabSz="914400" rtl="0" eaLnBrk="1" latinLnBrk="0" hangingPunct="1">
+                <a:defRPr sz="1800" kern="1200">
+                  <a:solidFill>
+                    <a:schemeClr val="lt1"/>
+                  </a:solidFill>
+                  <a:latin typeface="+mn-lt"/>
+                  <a:ea typeface="+mn-ea"/>
+                  <a:cs typeface="+mn-cs"/>
+                </a:defRPr>
+              </a:lvl7pPr>
+              <a:lvl8pPr marL="3200400" algn="l" defTabSz="914400" rtl="0" eaLnBrk="1" latinLnBrk="0" hangingPunct="1">
+                <a:defRPr sz="1800" kern="1200">
+                  <a:solidFill>
+                    <a:schemeClr val="lt1"/>
+                  </a:solidFill>
+                  <a:latin typeface="+mn-lt"/>
+                  <a:ea typeface="+mn-ea"/>
+                  <a:cs typeface="+mn-cs"/>
+                </a:defRPr>
+              </a:lvl8pPr>
+              <a:lvl9pPr marL="3657600" algn="l" defTabSz="914400" rtl="0" eaLnBrk="1" latinLnBrk="0" hangingPunct="1">
+                <a:defRPr sz="1800" kern="1200">
+                  <a:solidFill>
+                    <a:schemeClr val="lt1"/>
+                  </a:solidFill>
+                  <a:latin typeface="+mn-lt"/>
+                  <a:ea typeface="+mn-ea"/>
+                  <a:cs typeface="+mn-cs"/>
+                </a:defRPr>
+              </a:lvl9pPr>
+            </a:lstStyle>
+            <a:p>
+              <a:pPr algn="ctr"/>
+              <a:endParaRPr lang="en-US" dirty="0"/>
+            </a:p>
+          </p:txBody>
+        </p:sp>
+      </p:grpSp>
+      <p:pic>
+        <p:nvPicPr>
+          <p:cNvPr id="7" name="Picture 6" descr="Map&#10;&#10;Description automatically generated">
+            <a:extLst>
+              <a:ext uri="{FF2B5EF4-FFF2-40B4-BE49-F238E27FC236}">
+                <a16:creationId xmlns:a16="http://schemas.microsoft.com/office/drawing/2014/main" id="{230FFE6A-228F-4874-80FC-E953455245CC}"/>
+              </a:ext>
+            </a:extLst>
+          </p:cNvPr>
+          <p:cNvPicPr>
+            <a:picLocks noChangeAspect="1"/>
+          </p:cNvPicPr>
+          <p:nvPr/>
+        </p:nvPicPr>
+        <p:blipFill>
+          <a:blip r:embed="rId2">
+            <a:extLst>
+              <a:ext uri="{28A0092B-C50C-407E-A947-70E740481C1C}">
+                <a14:useLocalDpi xmlns:a14="http://schemas.microsoft.com/office/drawing/2010/main" val="0"/>
+              </a:ext>
+            </a:extLst>
+          </a:blip>
+          <a:stretch>
+            <a:fillRect/>
+          </a:stretch>
+        </p:blipFill>
+        <p:spPr>
+          <a:xfrm>
+            <a:off x="7392757" y="3428998"/>
+            <a:ext cx="4591368" cy="3259341"/>
+          </a:xfrm>
+          <a:prstGeom prst="rect">
+            <a:avLst/>
+          </a:prstGeom>
+        </p:spPr>
+      </p:pic>
+      <p:pic>
+        <p:nvPicPr>
+          <p:cNvPr id="5" name="Content Placeholder 4" descr="Map&#10;&#10;Description automatically generated">
+            <a:extLst>
+              <a:ext uri="{FF2B5EF4-FFF2-40B4-BE49-F238E27FC236}">
+                <a16:creationId xmlns:a16="http://schemas.microsoft.com/office/drawing/2014/main" id="{FCBF1390-4D9A-4A7C-9F39-F152A30EA1D8}"/>
+              </a:ext>
+            </a:extLst>
+          </p:cNvPr>
+          <p:cNvPicPr>
+            <a:picLocks noGrp="1" noChangeAspect="1"/>
+          </p:cNvPicPr>
+          <p:nvPr>
+            <p:ph idx="1"/>
+          </p:nvPr>
+        </p:nvPicPr>
+        <p:blipFill>
+          <a:blip r:embed="rId3">
+            <a:extLst>
+              <a:ext uri="{28A0092B-C50C-407E-A947-70E740481C1C}">
+                <a14:useLocalDpi xmlns:a14="http://schemas.microsoft.com/office/drawing/2010/main" val="0"/>
+              </a:ext>
+            </a:extLst>
+          </a:blip>
+          <a:stretch>
+            <a:fillRect/>
+          </a:stretch>
+        </p:blipFill>
+        <p:spPr>
+          <a:xfrm>
+            <a:off x="6844070" y="86201"/>
+            <a:ext cx="4587504" cy="3256598"/>
+          </a:xfrm>
+          <a:prstGeom prst="rect">
+            <a:avLst/>
+          </a:prstGeom>
+        </p:spPr>
+      </p:pic>
+      <p:sp>
+        <p:nvSpPr>
+          <p:cNvPr id="17" name="Content Placeholder 2">
+            <a:extLst>
+              <a:ext uri="{FF2B5EF4-FFF2-40B4-BE49-F238E27FC236}">
+                <a16:creationId xmlns:a16="http://schemas.microsoft.com/office/drawing/2014/main" id="{978E7345-A37E-479D-99B1-B18756283B43}"/>
+              </a:ext>
+            </a:extLst>
+          </p:cNvPr>
+          <p:cNvSpPr txBox="1">
+            <a:spLocks/>
+          </p:cNvSpPr>
+          <p:nvPr/>
+        </p:nvSpPr>
+        <p:spPr>
+          <a:xfrm>
+            <a:off x="484187" y="3818659"/>
+            <a:ext cx="5147685" cy="2404341"/>
+          </a:xfrm>
+          <a:prstGeom prst="rect">
+            <a:avLst/>
+          </a:prstGeom>
+        </p:spPr>
+        <p:txBody>
+          <a:bodyPr vert="horz" lIns="91440" tIns="45720" rIns="91440" bIns="45720" rtlCol="0" anchor="ctr">
+            <a:normAutofit/>
+          </a:bodyPr>
+          <a:lstStyle>
+            <a:lvl1pPr marL="0" indent="0" algn="l" defTabSz="914400" rtl="0" eaLnBrk="1" latinLnBrk="0" hangingPunct="1">
+              <a:lnSpc>
+                <a:spcPct val="120000"/>
+              </a:lnSpc>
+              <a:spcBef>
+                <a:spcPts val="1000"/>
+              </a:spcBef>
+              <a:buFont typeface="Arial" panose="020B0604020202020204" pitchFamily="34" charset="0"/>
+              <a:buNone/>
+              <a:defRPr sz="2000" kern="1200">
+                <a:solidFill>
+                  <a:schemeClr val="tx1"/>
+                </a:solidFill>
+                <a:latin typeface="+mn-lt"/>
+                <a:ea typeface="+mn-ea"/>
+                <a:cs typeface="+mn-cs"/>
+              </a:defRPr>
+            </a:lvl1pPr>
+            <a:lvl2pPr marL="228600" indent="0" algn="l" defTabSz="914400" rtl="0" eaLnBrk="1" latinLnBrk="0" hangingPunct="1">
+              <a:lnSpc>
+                <a:spcPct val="120000"/>
+              </a:lnSpc>
+              <a:spcBef>
+                <a:spcPts val="500"/>
+              </a:spcBef>
+              <a:buFont typeface="Arial" panose="020B0604020202020204" pitchFamily="34" charset="0"/>
+              <a:buNone/>
+              <a:defRPr sz="1800" kern="1200">
+                <a:solidFill>
+                  <a:schemeClr val="tx1"/>
+                </a:solidFill>
+                <a:latin typeface="+mn-lt"/>
+                <a:ea typeface="+mn-ea"/>
+                <a:cs typeface="+mn-cs"/>
+              </a:defRPr>
+            </a:lvl2pPr>
+            <a:lvl3pPr marL="457200" indent="0" algn="l" defTabSz="914400" rtl="0" eaLnBrk="1" latinLnBrk="0" hangingPunct="1">
+              <a:lnSpc>
+                <a:spcPct val="120000"/>
+              </a:lnSpc>
+              <a:spcBef>
+                <a:spcPts val="500"/>
+              </a:spcBef>
+              <a:buFont typeface="Arial" panose="020B0604020202020204" pitchFamily="34" charset="0"/>
+              <a:buNone/>
+              <a:defRPr sz="1600" kern="1200">
+                <a:solidFill>
+                  <a:schemeClr val="tx1"/>
+                </a:solidFill>
+                <a:latin typeface="+mn-lt"/>
+                <a:ea typeface="+mn-ea"/>
+                <a:cs typeface="+mn-cs"/>
+              </a:defRPr>
+            </a:lvl3pPr>
+            <a:lvl4pPr marL="685800" indent="0" algn="l" defTabSz="914400" rtl="0" eaLnBrk="1" latinLnBrk="0" hangingPunct="1">
+              <a:lnSpc>
+                <a:spcPct val="120000"/>
+              </a:lnSpc>
+              <a:spcBef>
+                <a:spcPts val="500"/>
+              </a:spcBef>
+              <a:buFont typeface="Arial" panose="020B0604020202020204" pitchFamily="34" charset="0"/>
+              <a:buNone/>
+              <a:defRPr sz="1400" kern="1200">
+                <a:solidFill>
+                  <a:schemeClr val="tx1"/>
+                </a:solidFill>
+                <a:latin typeface="+mn-lt"/>
+                <a:ea typeface="+mn-ea"/>
+                <a:cs typeface="+mn-cs"/>
+              </a:defRPr>
+            </a:lvl4pPr>
+            <a:lvl5pPr marL="914400" indent="0" algn="l" defTabSz="914400" rtl="0" eaLnBrk="1" latinLnBrk="0" hangingPunct="1">
+              <a:lnSpc>
+                <a:spcPct val="120000"/>
+              </a:lnSpc>
+              <a:spcBef>
+                <a:spcPts val="500"/>
+              </a:spcBef>
+              <a:buFont typeface="Arial" panose="020B0604020202020204" pitchFamily="34" charset="0"/>
+              <a:buNone/>
+              <a:defRPr sz="1400" kern="1200">
+                <a:solidFill>
+                  <a:schemeClr val="tx1"/>
+                </a:solidFill>
+                <a:latin typeface="+mn-lt"/>
+                <a:ea typeface="+mn-ea"/>
+                <a:cs typeface="+mn-cs"/>
+              </a:defRPr>
+            </a:lvl5pPr>
+            <a:lvl6pPr marL="2514600" indent="-228600" algn="l" defTabSz="914400" rtl="0" eaLnBrk="1" latinLnBrk="0" hangingPunct="1">
+              <a:lnSpc>
+                <a:spcPct val="90000"/>
+              </a:lnSpc>
+              <a:spcBef>
+                <a:spcPts val="500"/>
+              </a:spcBef>
+              <a:buFont typeface="Arial" panose="020B0604020202020204" pitchFamily="34" charset="0"/>
+              <a:buChar char="•"/>
+              <a:defRPr sz="1800" kern="1200">
+                <a:solidFill>
+                  <a:schemeClr val="tx1"/>
+                </a:solidFill>
+                <a:latin typeface="+mn-lt"/>
+                <a:ea typeface="+mn-ea"/>
+                <a:cs typeface="+mn-cs"/>
+              </a:defRPr>
+            </a:lvl6pPr>
+            <a:lvl7pPr marL="2971800" indent="-228600" algn="l" defTabSz="914400" rtl="0" eaLnBrk="1" latinLnBrk="0" hangingPunct="1">
+              <a:lnSpc>
+                <a:spcPct val="90000"/>
+              </a:lnSpc>
+              <a:spcBef>
+                <a:spcPts val="500"/>
+              </a:spcBef>
+              <a:buFont typeface="Arial" panose="020B0604020202020204" pitchFamily="34" charset="0"/>
+              <a:buChar char="•"/>
+              <a:defRPr sz="1800" kern="1200">
+                <a:solidFill>
+                  <a:schemeClr val="tx1"/>
+                </a:solidFill>
+                <a:latin typeface="+mn-lt"/>
+                <a:ea typeface="+mn-ea"/>
+                <a:cs typeface="+mn-cs"/>
+              </a:defRPr>
+            </a:lvl7pPr>
+            <a:lvl8pPr marL="3429000" indent="-228600" algn="l" defTabSz="914400" rtl="0" eaLnBrk="1" latinLnBrk="0" hangingPunct="1">
+              <a:lnSpc>
+                <a:spcPct val="90000"/>
+              </a:lnSpc>
+              <a:spcBef>
+                <a:spcPts val="500"/>
+              </a:spcBef>
+              <a:buFont typeface="Arial" panose="020B0604020202020204" pitchFamily="34" charset="0"/>
+              <a:buChar char="•"/>
+              <a:defRPr sz="1800" kern="1200">
+                <a:solidFill>
+                  <a:schemeClr val="tx1"/>
+                </a:solidFill>
+                <a:latin typeface="+mn-lt"/>
+                <a:ea typeface="+mn-ea"/>
+                <a:cs typeface="+mn-cs"/>
+              </a:defRPr>
+            </a:lvl8pPr>
+            <a:lvl9pPr marL="3886200" indent="-228600" algn="l" defTabSz="914400" rtl="0" eaLnBrk="1" latinLnBrk="0" hangingPunct="1">
+              <a:lnSpc>
+                <a:spcPct val="90000"/>
+              </a:lnSpc>
+              <a:spcBef>
+                <a:spcPts val="500"/>
+              </a:spcBef>
+              <a:buFont typeface="Arial" panose="020B0604020202020204" pitchFamily="34" charset="0"/>
+              <a:buChar char="•"/>
+              <a:defRPr sz="1800" kern="1200">
+                <a:solidFill>
+                  <a:schemeClr val="tx1"/>
+                </a:solidFill>
+                <a:latin typeface="+mn-lt"/>
+                <a:ea typeface="+mn-ea"/>
+                <a:cs typeface="+mn-cs"/>
+              </a:defRPr>
+            </a:lvl9pPr>
+          </a:lstStyle>
+          <a:p>
+            <a:r>
+              <a:rPr lang="en-US" sz="2400"/>
+              <a:t>Are Asian Americans Clustered?</a:t>
+            </a:r>
+            <a:endParaRPr lang="en-US" sz="2400" dirty="0"/>
+          </a:p>
+        </p:txBody>
+      </p:sp>
+    </p:spTree>
+    <p:extLst>
+      <p:ext uri="{BB962C8B-B14F-4D97-AF65-F5344CB8AC3E}">
+        <p14:creationId xmlns:p14="http://schemas.microsoft.com/office/powerpoint/2010/main" val="1286035323"/>
       </p:ext>
     </p:extLst>
   </p:cSld>

</xml_diff>